<commit_message>
Updated and corrected pptx (isels1)
</commit_message>
<xml_diff>
--- a/doc/task02/Task2.pptx
+++ b/doc/task02/Task2.pptx
@@ -149,7 +149,7 @@
   </p:defaultTextStyle>
   <p:extLst>
     <p:ext uri="{EFAFB233-063F-42B5-8137-9DF3F51BA10A}">
-      <p15:sldGuideLst xmlns:p15="http://schemas.microsoft.com/office/powerpoint/2012/main">
+      <p15:sldGuideLst xmlns:p15="http://schemas.microsoft.com/office/powerpoint/2012/main" xmlns="">
         <p15:guide id="1" orient="horz" pos="2160">
           <p15:clr>
             <a:srgbClr val="A4A3A4"/>
@@ -163,7 +163,7 @@
       </p15:sldGuideLst>
     </p:ext>
     <p:ext uri="{2D200454-40CA-4A62-9FC3-DE9A4176ACB9}">
-      <p15:notesGuideLst xmlns:p15="http://schemas.microsoft.com/office/powerpoint/2012/main">
+      <p15:notesGuideLst xmlns:p15="http://schemas.microsoft.com/office/powerpoint/2012/main" xmlns="">
         <p15:guide id="1" orient="horz" pos="3127">
           <p15:clr>
             <a:srgbClr val="A4A3A4"/>
@@ -262,7 +262,7 @@
           <a:p>
             <a:fld id="{EFA0D184-D464-48E9-9CA0-A94E873F6C2C}" type="datetimeFigureOut">
               <a:rPr lang="de-CH" smtClean="0"/>
-              <a:t>25.09.2015</a:t>
+              <a:t>26.09.2015</a:t>
             </a:fld>
             <a:endParaRPr lang="de-CH"/>
           </a:p>
@@ -427,7 +427,7 @@
           <a:p>
             <a:fld id="{5AF2B663-2BA9-4D7E-8201-5DE4109E1EDD}" type="datetimeFigureOut">
               <a:rPr lang="de-CH" smtClean="0"/>
-              <a:t>25.09.2015</a:t>
+              <a:t>26.09.2015</a:t>
             </a:fld>
             <a:endParaRPr lang="de-CH"/>
           </a:p>
@@ -1727,15 +1727,15 @@
             <a:noFill/>
           </a:ln>
           <a:extLst>
-            <a:ext uri="{909E8E84-426E-40dd-AFC4-6F175D3DCCD1}">
-              <a14:hiddenFill xmlns:a14="http://schemas.microsoft.com/office/drawing/2010/main" xmlns="">
+            <a:ext uri="{909E8E84-426E-40DD-AFC4-6F175D3DCCD1}">
+              <a14:hiddenFill xmlns:a14="http://schemas.microsoft.com/office/drawing/2010/main">
                 <a:solidFill>
                   <a:srgbClr val="FFFFFF"/>
                 </a:solidFill>
               </a14:hiddenFill>
             </a:ext>
-            <a:ext uri="{91240B29-F687-4f45-9708-019B960494DF}">
-              <a14:hiddenLine xmlns:a14="http://schemas.microsoft.com/office/drawing/2010/main" xmlns="" w="9525">
+            <a:ext uri="{91240B29-F687-4F45-9708-019B960494DF}">
+              <a14:hiddenLine xmlns:a14="http://schemas.microsoft.com/office/drawing/2010/main" w="9525">
                 <a:solidFill>
                   <a:srgbClr val="000000"/>
                 </a:solidFill>
@@ -3467,15 +3467,15 @@
             <a:noFill/>
           </a:ln>
           <a:extLst>
-            <a:ext uri="{909E8E84-426E-40dd-AFC4-6F175D3DCCD1}">
-              <a14:hiddenFill xmlns:a14="http://schemas.microsoft.com/office/drawing/2010/main" xmlns="">
+            <a:ext uri="{909E8E84-426E-40DD-AFC4-6F175D3DCCD1}">
+              <a14:hiddenFill xmlns:a14="http://schemas.microsoft.com/office/drawing/2010/main">
                 <a:solidFill>
                   <a:srgbClr val="FFFFFF"/>
                 </a:solidFill>
               </a14:hiddenFill>
             </a:ext>
-            <a:ext uri="{91240B29-F687-4f45-9708-019B960494DF}">
-              <a14:hiddenLine xmlns:a14="http://schemas.microsoft.com/office/drawing/2010/main" xmlns="" w="9525">
+            <a:ext uri="{91240B29-F687-4F45-9708-019B960494DF}">
+              <a14:hiddenLine xmlns:a14="http://schemas.microsoft.com/office/drawing/2010/main" w="9525">
                 <a:solidFill>
                   <a:srgbClr val="000000"/>
                 </a:solidFill>
@@ -6948,15 +6948,15 @@
             <a:noFill/>
           </a:ln>
           <a:extLst>
-            <a:ext uri="{909E8E84-426E-40dd-AFC4-6F175D3DCCD1}">
-              <a14:hiddenFill xmlns:a14="http://schemas.microsoft.com/office/drawing/2010/main" xmlns="">
+            <a:ext uri="{909E8E84-426E-40DD-AFC4-6F175D3DCCD1}">
+              <a14:hiddenFill xmlns:a14="http://schemas.microsoft.com/office/drawing/2010/main">
                 <a:solidFill>
                   <a:srgbClr val="FFFFFF"/>
                 </a:solidFill>
               </a14:hiddenFill>
             </a:ext>
-            <a:ext uri="{91240B29-F687-4f45-9708-019B960494DF}">
-              <a14:hiddenLine xmlns:a14="http://schemas.microsoft.com/office/drawing/2010/main" xmlns="" w="9525">
+            <a:ext uri="{91240B29-F687-4F45-9708-019B960494DF}">
+              <a14:hiddenLine xmlns:a14="http://schemas.microsoft.com/office/drawing/2010/main" w="9525">
                 <a:solidFill>
                   <a:srgbClr val="000000"/>
                 </a:solidFill>
@@ -8657,7 +8657,7 @@
           <p:nvPr>
             <p:extLst>
               <p:ext uri="{D42A27DB-BD31-4B8C-83A1-F6EECF244321}">
-                <p14:modId xmlns:p14="http://schemas.microsoft.com/office/powerpoint/2010/main" val="2357199822"/>
+                <p14:modId xmlns:p14="http://schemas.microsoft.com/office/powerpoint/2010/main" val="3177993667"/>
               </p:ext>
             </p:extLst>
           </p:nvPr>
@@ -8762,7 +8762,11 @@
                     <a:p>
                       <a:r>
                         <a:rPr lang="de-CH" dirty="0" smtClean="0"/>
-                        <a:t>Endlos</a:t>
+                        <a:t>Kann endlos</a:t>
+                      </a:r>
+                      <a:r>
+                        <a:rPr lang="de-CH" baseline="0" dirty="0" smtClean="0"/>
+                        <a:t> werden</a:t>
                       </a:r>
                       <a:endParaRPr lang="en-GB" dirty="0"/>
                     </a:p>
@@ -9125,7 +9129,7 @@
 </file>
 
 <file path=ppt/slides/slide5.xml><?xml version="1.0" encoding="utf-8"?>
-<p:sld xmlns:a="http://schemas.openxmlformats.org/drawingml/2006/main" xmlns:r="http://schemas.openxmlformats.org/officeDocument/2006/relationships" xmlns:p="http://schemas.openxmlformats.org/presentationml/2006/main">
+<p:sld xmlns:a="http://schemas.openxmlformats.org/drawingml/2006/main" xmlns:r="http://schemas.openxmlformats.org/officeDocument/2006/relationships" xmlns:p="http://schemas.openxmlformats.org/presentationml/2006/main" show="0">
   <p:cSld>
     <p:spTree>
       <p:nvGrpSpPr>
@@ -9175,14 +9179,14 @@
           <p:nvPr>
             <p:extLst>
               <p:ext uri="{D42A27DB-BD31-4B8C-83A1-F6EECF244321}">
-                <p14:modId xmlns:p14="http://schemas.microsoft.com/office/powerpoint/2010/main" val="1355916368"/>
+                <p14:modId xmlns:p14="http://schemas.microsoft.com/office/powerpoint/2010/main" val="3332318167"/>
               </p:ext>
             </p:extLst>
           </p:nvPr>
         </p:nvGraphicFramePr>
         <p:xfrm>
           <a:off x="849086" y="1086274"/>
-          <a:ext cx="7707086" cy="4713635"/>
+          <a:ext cx="7707086" cy="6042930"/>
         </p:xfrm>
         <a:graphic>
           <a:graphicData uri="http://schemas.openxmlformats.org/drawingml/2006/table">
@@ -9202,11 +9206,32 @@
                     <a:bodyPr/>
                     <a:lstStyle/>
                     <a:p>
+                      <a:pPr>
+                        <a:lnSpc>
+                          <a:spcPct val="115000"/>
+                        </a:lnSpc>
+                        <a:spcAft>
+                          <a:spcPts val="0"/>
+                        </a:spcAft>
+                      </a:pPr>
                       <a:r>
-                        <a:rPr lang="de-CH" sz="1600" dirty="0" smtClean="0"/>
+                        <a:rPr lang="de-CH" sz="1100" b="1" dirty="0">
+                          <a:solidFill>
+                            <a:srgbClr val="FFFFFF"/>
+                          </a:solidFill>
+                          <a:effectLst/>
+                          <a:latin typeface="Calibri"/>
+                          <a:ea typeface="Calibri"/>
+                          <a:cs typeface="Times New Roman"/>
+                        </a:rPr>
                         <a:t>Aktivitäten</a:t>
                       </a:r>
-                      <a:endParaRPr lang="en-GB" sz="1600" dirty="0"/>
+                      <a:endParaRPr lang="en-GB" sz="1100" dirty="0">
+                        <a:effectLst/>
+                        <a:latin typeface="Calibri"/>
+                        <a:ea typeface="Calibri"/>
+                        <a:cs typeface="Times New Roman"/>
+                      </a:endParaRPr>
                     </a:p>
                   </a:txBody>
                   <a:tcPr/>
@@ -9216,11 +9241,32 @@
                     <a:bodyPr/>
                     <a:lstStyle/>
                     <a:p>
+                      <a:pPr>
+                        <a:lnSpc>
+                          <a:spcPct val="115000"/>
+                        </a:lnSpc>
+                        <a:spcAft>
+                          <a:spcPts val="0"/>
+                        </a:spcAft>
+                      </a:pPr>
                       <a:r>
-                        <a:rPr lang="de-CH" sz="1600" dirty="0" smtClean="0"/>
+                        <a:rPr lang="de-CH" sz="1100" b="1">
+                          <a:solidFill>
+                            <a:srgbClr val="FFFFFF"/>
+                          </a:solidFill>
+                          <a:effectLst/>
+                          <a:latin typeface="Calibri"/>
+                          <a:ea typeface="Calibri"/>
+                          <a:cs typeface="Times New Roman"/>
+                        </a:rPr>
                         <a:t>Ziel</a:t>
                       </a:r>
-                      <a:endParaRPr lang="en-GB" sz="1600" dirty="0"/>
+                      <a:endParaRPr lang="en-GB" sz="1100">
+                        <a:effectLst/>
+                        <a:latin typeface="Calibri"/>
+                        <a:ea typeface="Calibri"/>
+                        <a:cs typeface="Times New Roman"/>
+                      </a:endParaRPr>
                     </a:p>
                   </a:txBody>
                   <a:tcPr/>
@@ -9230,11 +9276,32 @@
                     <a:bodyPr/>
                     <a:lstStyle/>
                     <a:p>
+                      <a:pPr>
+                        <a:lnSpc>
+                          <a:spcPct val="115000"/>
+                        </a:lnSpc>
+                        <a:spcAft>
+                          <a:spcPts val="0"/>
+                        </a:spcAft>
+                      </a:pPr>
                       <a:r>
-                        <a:rPr lang="de-CH" sz="1600" dirty="0" smtClean="0"/>
+                        <a:rPr lang="de-CH" sz="1100" b="1">
+                          <a:solidFill>
+                            <a:srgbClr val="FFFFFF"/>
+                          </a:solidFill>
+                          <a:effectLst/>
+                          <a:latin typeface="Calibri"/>
+                          <a:ea typeface="Calibri"/>
+                          <a:cs typeface="Times New Roman"/>
+                        </a:rPr>
                         <a:t>Aufgabe</a:t>
                       </a:r>
-                      <a:endParaRPr lang="en-GB" sz="1600" dirty="0"/>
+                      <a:endParaRPr lang="en-GB" sz="1100">
+                        <a:effectLst/>
+                        <a:latin typeface="Calibri"/>
+                        <a:ea typeface="Calibri"/>
+                        <a:cs typeface="Times New Roman"/>
+                      </a:endParaRPr>
                     </a:p>
                   </a:txBody>
                   <a:tcPr/>
@@ -9244,129 +9311,32 @@
                     <a:bodyPr/>
                     <a:lstStyle/>
                     <a:p>
+                      <a:pPr>
+                        <a:lnSpc>
+                          <a:spcPct val="115000"/>
+                        </a:lnSpc>
+                        <a:spcAft>
+                          <a:spcPts val="0"/>
+                        </a:spcAft>
+                      </a:pPr>
                       <a:r>
-                        <a:rPr lang="de-CH" sz="1600" dirty="0" smtClean="0"/>
+                        <a:rPr lang="de-CH" sz="1100" b="1">
+                          <a:solidFill>
+                            <a:srgbClr val="FFFFFF"/>
+                          </a:solidFill>
+                          <a:effectLst/>
+                          <a:latin typeface="Calibri"/>
+                          <a:ea typeface="Calibri"/>
+                          <a:cs typeface="Times New Roman"/>
+                        </a:rPr>
                         <a:t>Resultat</a:t>
                       </a:r>
-                      <a:endParaRPr lang="en-GB" sz="1600" dirty="0"/>
-                    </a:p>
-                  </a:txBody>
-                  <a:tcPr/>
-                </a:tc>
-              </a:tr>
-              <a:tr h="1205447">
-                <a:tc>
-                  <a:txBody>
-                    <a:bodyPr/>
-                    <a:lstStyle/>
-                    <a:p>
-                      <a:r>
-                        <a:rPr lang="de-CH" sz="1200" dirty="0" smtClean="0"/>
-                        <a:t>Spezifikation</a:t>
-                      </a:r>
-                      <a:endParaRPr lang="en-GB" sz="1200" dirty="0"/>
-                    </a:p>
-                  </a:txBody>
-                  <a:tcPr/>
-                </a:tc>
-                <a:tc>
-                  <a:txBody>
-                    <a:bodyPr/>
-                    <a:lstStyle/>
-                    <a:p>
-                      <a:pPr marL="285750" indent="-285750">
-                        <a:buFont typeface="Arial" panose="020B0604020202020204" pitchFamily="34" charset="0"/>
-                        <a:buChar char="•"/>
-                      </a:pPr>
-                      <a:r>
-                        <a:rPr lang="de-CH" sz="1200" dirty="0" smtClean="0"/>
-                        <a:t>Anforderungen Definiert</a:t>
-                      </a:r>
-                    </a:p>
-                    <a:p>
-                      <a:pPr marL="285750" indent="-285750">
-                        <a:buFont typeface="Arial" panose="020B0604020202020204" pitchFamily="34" charset="0"/>
-                        <a:buChar char="•"/>
-                      </a:pPr>
-                      <a:r>
-                        <a:rPr lang="de-CH" sz="1200" dirty="0" smtClean="0"/>
-                        <a:t>Planung abgeschlossen</a:t>
-                      </a:r>
-                      <a:r>
-                        <a:rPr lang="de-CH" sz="1200" baseline="0" dirty="0" smtClean="0"/>
-                        <a:t> </a:t>
-                      </a:r>
-                    </a:p>
-                    <a:p>
-                      <a:pPr marL="285750" indent="-285750">
-                        <a:buFont typeface="Arial" panose="020B0604020202020204" pitchFamily="34" charset="0"/>
-                        <a:buChar char="•"/>
-                      </a:pPr>
-                      <a:r>
-                        <a:rPr lang="de-CH" sz="1200" baseline="0" dirty="0" smtClean="0"/>
-                        <a:t>Wichtige Entscheidungen getroffen</a:t>
-                      </a:r>
-                      <a:endParaRPr lang="en-GB" sz="1200" dirty="0"/>
-                    </a:p>
-                  </a:txBody>
-                  <a:tcPr/>
-                </a:tc>
-                <a:tc>
-                  <a:txBody>
-                    <a:bodyPr/>
-                    <a:lstStyle/>
-                    <a:p>
-                      <a:pPr marL="285750" indent="-285750">
-                        <a:buFont typeface="Arial" panose="020B0604020202020204" pitchFamily="34" charset="0"/>
-                        <a:buChar char="•"/>
-                      </a:pPr>
-                      <a:r>
-                        <a:rPr lang="de-CH" sz="1200" dirty="0" smtClean="0"/>
-                        <a:t>Entscheidung treffen</a:t>
-                      </a:r>
-                    </a:p>
-                    <a:p>
-                      <a:pPr marL="285750" indent="-285750">
-                        <a:buFont typeface="Arial" panose="020B0604020202020204" pitchFamily="34" charset="0"/>
-                        <a:buChar char="•"/>
-                      </a:pPr>
-                      <a:r>
-                        <a:rPr lang="de-CH" sz="1200" dirty="0" smtClean="0"/>
-                        <a:t>Prioritäten</a:t>
-                      </a:r>
-                      <a:r>
-                        <a:rPr lang="de-CH" sz="1200" baseline="0" dirty="0" smtClean="0"/>
-                        <a:t> definieren</a:t>
-                      </a:r>
-                    </a:p>
-                    <a:p>
-                      <a:pPr marL="285750" indent="-285750">
-                        <a:buFont typeface="Arial" panose="020B0604020202020204" pitchFamily="34" charset="0"/>
-                        <a:buChar char="•"/>
-                      </a:pPr>
-                      <a:r>
-                        <a:rPr lang="de-CH" sz="1200" baseline="0" dirty="0" smtClean="0"/>
-                        <a:t>Planen</a:t>
-                      </a:r>
-                      <a:endParaRPr lang="en-GB" sz="1200" dirty="0"/>
-                    </a:p>
-                  </a:txBody>
-                  <a:tcPr/>
-                </a:tc>
-                <a:tc>
-                  <a:txBody>
-                    <a:bodyPr/>
-                    <a:lstStyle/>
-                    <a:p>
-                      <a:r>
-                        <a:rPr lang="de-CH" sz="1200" dirty="0" smtClean="0"/>
-                        <a:t>Dokumentation</a:t>
-                      </a:r>
-                      <a:r>
-                        <a:rPr lang="de-CH" sz="1200" baseline="0" dirty="0" smtClean="0"/>
-                        <a:t> und Planung</a:t>
-                      </a:r>
-                      <a:endParaRPr lang="en-GB" sz="1200" dirty="0"/>
+                      <a:endParaRPr lang="en-GB" sz="1100">
+                        <a:effectLst/>
+                        <a:latin typeface="Calibri"/>
+                        <a:ea typeface="Calibri"/>
+                        <a:cs typeface="Times New Roman"/>
+                      </a:endParaRPr>
                     </a:p>
                   </a:txBody>
                   <a:tcPr/>
@@ -9378,11 +9348,372 @@
                     <a:bodyPr/>
                     <a:lstStyle/>
                     <a:p>
+                      <a:pPr>
+                        <a:lnSpc>
+                          <a:spcPct val="115000"/>
+                        </a:lnSpc>
+                        <a:spcAft>
+                          <a:spcPts val="0"/>
+                        </a:spcAft>
+                      </a:pPr>
                       <a:r>
-                        <a:rPr lang="de-CH" sz="1200" dirty="0" smtClean="0"/>
-                        <a:t>Entwicklung</a:t>
+                        <a:rPr lang="de-CH" sz="1100" dirty="0">
+                          <a:effectLst/>
+                          <a:latin typeface="Calibri"/>
+                          <a:ea typeface="Calibri"/>
+                          <a:cs typeface="Times New Roman"/>
+                        </a:rPr>
+                        <a:t>Spezifikation</a:t>
                       </a:r>
-                      <a:endParaRPr lang="en-GB" sz="1200" dirty="0"/>
+                      <a:endParaRPr lang="en-GB" sz="1100" dirty="0">
+                        <a:effectLst/>
+                        <a:latin typeface="Calibri"/>
+                        <a:ea typeface="Calibri"/>
+                        <a:cs typeface="Times New Roman"/>
+                      </a:endParaRPr>
+                    </a:p>
+                  </a:txBody>
+                  <a:tcPr>
+                    <a:solidFill>
+                      <a:schemeClr val="accent2">
+                        <a:lumMod val="40000"/>
+                        <a:lumOff val="60000"/>
+                      </a:schemeClr>
+                    </a:solidFill>
+                  </a:tcPr>
+                </a:tc>
+                <a:tc>
+                  <a:txBody>
+                    <a:bodyPr/>
+                    <a:lstStyle/>
+                    <a:p>
+                      <a:pPr marL="342900" lvl="0" indent="-342900">
+                        <a:lnSpc>
+                          <a:spcPct val="115000"/>
+                        </a:lnSpc>
+                        <a:spcAft>
+                          <a:spcPts val="0"/>
+                        </a:spcAft>
+                        <a:buFont typeface="Symbol"/>
+                        <a:buChar char=""/>
+                      </a:pPr>
+                      <a:r>
+                        <a:rPr lang="de-CH" sz="1100" dirty="0">
+                          <a:effectLst/>
+                          <a:latin typeface="Calibri"/>
+                          <a:ea typeface="Calibri"/>
+                          <a:cs typeface="Times New Roman"/>
+                        </a:rPr>
+                        <a:t>Anforderungen Definiert</a:t>
+                      </a:r>
+                      <a:endParaRPr lang="en-GB" sz="1100" dirty="0">
+                        <a:effectLst/>
+                        <a:latin typeface="Calibri"/>
+                        <a:ea typeface="Calibri"/>
+                        <a:cs typeface="Times New Roman"/>
+                      </a:endParaRPr>
+                    </a:p>
+                    <a:p>
+                      <a:pPr marL="342900" lvl="0" indent="-342900">
+                        <a:lnSpc>
+                          <a:spcPct val="115000"/>
+                        </a:lnSpc>
+                        <a:spcAft>
+                          <a:spcPts val="0"/>
+                        </a:spcAft>
+                        <a:buFont typeface="Symbol"/>
+                        <a:buChar char=""/>
+                      </a:pPr>
+                      <a:r>
+                        <a:rPr lang="de-CH" sz="1100" dirty="0">
+                          <a:effectLst/>
+                          <a:latin typeface="Calibri"/>
+                          <a:ea typeface="Calibri"/>
+                          <a:cs typeface="Times New Roman"/>
+                        </a:rPr>
+                        <a:t>Rahmen Planung</a:t>
+                      </a:r>
+                      <a:endParaRPr lang="en-GB" sz="1100" dirty="0">
+                        <a:effectLst/>
+                        <a:latin typeface="Calibri"/>
+                        <a:ea typeface="Calibri"/>
+                        <a:cs typeface="Times New Roman"/>
+                      </a:endParaRPr>
+                    </a:p>
+                    <a:p>
+                      <a:pPr marL="342900" lvl="0" indent="-342900">
+                        <a:lnSpc>
+                          <a:spcPct val="115000"/>
+                        </a:lnSpc>
+                        <a:spcAft>
+                          <a:spcPts val="0"/>
+                        </a:spcAft>
+                        <a:buFont typeface="Symbol"/>
+                        <a:buChar char=""/>
+                      </a:pPr>
+                      <a:r>
+                        <a:rPr lang="de-CH" sz="1100" dirty="0">
+                          <a:effectLst/>
+                          <a:latin typeface="Calibri"/>
+                          <a:ea typeface="Calibri"/>
+                          <a:cs typeface="Times New Roman"/>
+                        </a:rPr>
+                        <a:t>Wichtige Entscheidungen getroffen</a:t>
+                      </a:r>
+                      <a:endParaRPr lang="en-GB" sz="1100" dirty="0">
+                        <a:effectLst/>
+                        <a:latin typeface="Calibri"/>
+                        <a:ea typeface="Calibri"/>
+                        <a:cs typeface="Times New Roman"/>
+                      </a:endParaRPr>
+                    </a:p>
+                  </a:txBody>
+                  <a:tcPr>
+                    <a:solidFill>
+                      <a:schemeClr val="accent2">
+                        <a:lumMod val="40000"/>
+                        <a:lumOff val="60000"/>
+                      </a:schemeClr>
+                    </a:solidFill>
+                  </a:tcPr>
+                </a:tc>
+                <a:tc>
+                  <a:txBody>
+                    <a:bodyPr/>
+                    <a:lstStyle/>
+                    <a:p>
+                      <a:pPr marL="342900" lvl="0" indent="-342900">
+                        <a:lnSpc>
+                          <a:spcPct val="115000"/>
+                        </a:lnSpc>
+                        <a:spcAft>
+                          <a:spcPts val="0"/>
+                        </a:spcAft>
+                        <a:buFont typeface="Symbol"/>
+                        <a:buChar char=""/>
+                      </a:pPr>
+                      <a:r>
+                        <a:rPr lang="de-CH" sz="1100" dirty="0">
+                          <a:effectLst/>
+                          <a:latin typeface="Calibri"/>
+                          <a:ea typeface="Calibri"/>
+                          <a:cs typeface="Times New Roman"/>
+                        </a:rPr>
+                        <a:t>Entscheidung treffen</a:t>
+                      </a:r>
+                      <a:endParaRPr lang="en-GB" sz="1100" dirty="0">
+                        <a:effectLst/>
+                        <a:latin typeface="Calibri"/>
+                        <a:ea typeface="Calibri"/>
+                        <a:cs typeface="Times New Roman"/>
+                      </a:endParaRPr>
+                    </a:p>
+                    <a:p>
+                      <a:pPr marL="342900" lvl="0" indent="-342900">
+                        <a:lnSpc>
+                          <a:spcPct val="115000"/>
+                        </a:lnSpc>
+                        <a:spcAft>
+                          <a:spcPts val="0"/>
+                        </a:spcAft>
+                        <a:buFont typeface="Symbol"/>
+                        <a:buChar char=""/>
+                      </a:pPr>
+                      <a:r>
+                        <a:rPr lang="de-CH" sz="1100" dirty="0">
+                          <a:effectLst/>
+                          <a:latin typeface="Calibri"/>
+                          <a:ea typeface="Calibri"/>
+                          <a:cs typeface="Times New Roman"/>
+                        </a:rPr>
+                        <a:t>Prioritäten definieren</a:t>
+                      </a:r>
+                      <a:endParaRPr lang="en-GB" sz="1100" dirty="0">
+                        <a:effectLst/>
+                        <a:latin typeface="Calibri"/>
+                        <a:ea typeface="Calibri"/>
+                        <a:cs typeface="Times New Roman"/>
+                      </a:endParaRPr>
+                    </a:p>
+                    <a:p>
+                      <a:pPr marL="342900" lvl="0" indent="-342900">
+                        <a:lnSpc>
+                          <a:spcPct val="115000"/>
+                        </a:lnSpc>
+                        <a:spcAft>
+                          <a:spcPts val="0"/>
+                        </a:spcAft>
+                        <a:buFont typeface="Symbol"/>
+                        <a:buChar char=""/>
+                      </a:pPr>
+                      <a:r>
+                        <a:rPr lang="de-CH" sz="1100" dirty="0">
+                          <a:effectLst/>
+                          <a:latin typeface="Calibri"/>
+                          <a:ea typeface="Calibri"/>
+                          <a:cs typeface="Times New Roman"/>
+                        </a:rPr>
+                        <a:t>Planen</a:t>
+                      </a:r>
+                      <a:endParaRPr lang="en-GB" sz="1100" dirty="0">
+                        <a:effectLst/>
+                        <a:latin typeface="Calibri"/>
+                        <a:ea typeface="Calibri"/>
+                        <a:cs typeface="Times New Roman"/>
+                      </a:endParaRPr>
+                    </a:p>
+                  </a:txBody>
+                  <a:tcPr>
+                    <a:solidFill>
+                      <a:schemeClr val="accent2">
+                        <a:lumMod val="40000"/>
+                        <a:lumOff val="60000"/>
+                      </a:schemeClr>
+                    </a:solidFill>
+                  </a:tcPr>
+                </a:tc>
+                <a:tc>
+                  <a:txBody>
+                    <a:bodyPr/>
+                    <a:lstStyle/>
+                    <a:p>
+                      <a:pPr>
+                        <a:lnSpc>
+                          <a:spcPct val="115000"/>
+                        </a:lnSpc>
+                        <a:spcAft>
+                          <a:spcPts val="0"/>
+                        </a:spcAft>
+                      </a:pPr>
+                      <a:r>
+                        <a:rPr lang="de-CH" sz="1100" dirty="0">
+                          <a:effectLst/>
+                          <a:latin typeface="Calibri"/>
+                          <a:ea typeface="Calibri"/>
+                          <a:cs typeface="Times New Roman"/>
+                        </a:rPr>
+                        <a:t>Dokumentation und grobe gesamt Planung</a:t>
+                      </a:r>
+                      <a:endParaRPr lang="en-GB" sz="1100" dirty="0">
+                        <a:effectLst/>
+                        <a:latin typeface="Calibri"/>
+                        <a:ea typeface="Calibri"/>
+                        <a:cs typeface="Times New Roman"/>
+                      </a:endParaRPr>
+                    </a:p>
+                  </a:txBody>
+                  <a:tcPr>
+                    <a:solidFill>
+                      <a:schemeClr val="accent2">
+                        <a:lumMod val="40000"/>
+                        <a:lumOff val="60000"/>
+                      </a:schemeClr>
+                    </a:solidFill>
+                  </a:tcPr>
+                </a:tc>
+              </a:tr>
+              <a:tr h="268877">
+                <a:tc gridSpan="4">
+                  <a:txBody>
+                    <a:bodyPr/>
+                    <a:lstStyle/>
+                    <a:p>
+                      <a:pPr algn="ctr">
+                        <a:lnSpc>
+                          <a:spcPct val="115000"/>
+                        </a:lnSpc>
+                        <a:spcAft>
+                          <a:spcPts val="0"/>
+                        </a:spcAft>
+                      </a:pPr>
+                      <a:r>
+                        <a:rPr lang="de-CH" sz="1100">
+                          <a:effectLst/>
+                          <a:latin typeface="Calibri"/>
+                          <a:ea typeface="Calibri"/>
+                          <a:cs typeface="Times New Roman"/>
+                        </a:rPr>
+                        <a:t>Start Iteration(en)</a:t>
+                      </a:r>
+                      <a:endParaRPr lang="en-GB" sz="1100">
+                        <a:effectLst/>
+                        <a:latin typeface="Calibri"/>
+                        <a:ea typeface="Calibri"/>
+                        <a:cs typeface="Times New Roman"/>
+                      </a:endParaRPr>
+                    </a:p>
+                  </a:txBody>
+                  <a:tcPr anchor="ctr"/>
+                </a:tc>
+                <a:tc hMerge="1">
+                  <a:txBody>
+                    <a:bodyPr/>
+                    <a:lstStyle/>
+                    <a:p>
+                      <a:endParaRPr lang="de-CH"/>
+                    </a:p>
+                  </a:txBody>
+                  <a:tcPr/>
+                </a:tc>
+                <a:tc hMerge="1">
+                  <a:txBody>
+                    <a:bodyPr/>
+                    <a:lstStyle/>
+                    <a:p>
+                      <a:endParaRPr lang="de-CH"/>
+                    </a:p>
+                  </a:txBody>
+                  <a:tcPr/>
+                </a:tc>
+                <a:tc hMerge="1">
+                  <a:txBody>
+                    <a:bodyPr/>
+                    <a:lstStyle/>
+                    <a:p>
+                      <a:endParaRPr lang="de-CH"/>
+                    </a:p>
+                  </a:txBody>
+                  <a:tcPr/>
+                </a:tc>
+              </a:tr>
+              <a:tr h="866791">
+                <a:tc>
+                  <a:txBody>
+                    <a:bodyPr/>
+                    <a:lstStyle/>
+                    <a:p>
+                      <a:pPr>
+                        <a:lnSpc>
+                          <a:spcPct val="115000"/>
+                        </a:lnSpc>
+                        <a:spcAft>
+                          <a:spcPts val="0"/>
+                        </a:spcAft>
+                      </a:pPr>
+                      <a:r>
+                        <a:rPr lang="en-GB" sz="1100">
+                          <a:effectLst/>
+                          <a:latin typeface="Calibri"/>
+                          <a:ea typeface="Calibri"/>
+                          <a:cs typeface="Times New Roman"/>
+                        </a:rPr>
+                        <a:t>User Stories </a:t>
+                      </a:r>
+                      <a:r>
+                        <a:rPr lang="de-CH" sz="1100">
+                          <a:effectLst/>
+                          <a:latin typeface="Calibri"/>
+                          <a:ea typeface="Calibri"/>
+                          <a:cs typeface="Times New Roman"/>
+                        </a:rPr>
+                        <a:t>auswählen</a:t>
+                      </a:r>
+                      <a:endParaRPr lang="en-GB" sz="1100">
+                        <a:effectLst/>
+                        <a:latin typeface="Calibri"/>
+                        <a:ea typeface="Calibri"/>
+                        <a:cs typeface="Times New Roman"/>
+                      </a:endParaRPr>
                     </a:p>
                   </a:txBody>
                   <a:tcPr/>
@@ -9392,15 +9723,67 @@
                     <a:bodyPr/>
                     <a:lstStyle/>
                     <a:p>
+                      <a:pPr marL="342900" lvl="0" indent="-342900">
+                        <a:lnSpc>
+                          <a:spcPct val="115000"/>
+                        </a:lnSpc>
+                        <a:spcAft>
+                          <a:spcPts val="0"/>
+                        </a:spcAft>
+                        <a:buFont typeface="Symbol"/>
+                        <a:buChar char=""/>
+                      </a:pPr>
                       <a:r>
-                        <a:rPr lang="de-CH" sz="1200" dirty="0" smtClean="0"/>
-                        <a:t>Software</a:t>
+                        <a:rPr lang="en-GB" sz="1100">
+                          <a:effectLst/>
+                          <a:latin typeface="Calibri"/>
+                          <a:ea typeface="Calibri"/>
+                          <a:cs typeface="Times New Roman"/>
+                        </a:rPr>
+                        <a:t>Iteration </a:t>
                       </a:r>
                       <a:r>
-                        <a:rPr lang="de-CH" sz="1200" baseline="0" dirty="0" smtClean="0"/>
-                        <a:t> Implementiert</a:t>
+                        <a:rPr lang="de-CH" sz="1100">
+                          <a:effectLst/>
+                          <a:latin typeface="Calibri"/>
+                          <a:ea typeface="Calibri"/>
+                          <a:cs typeface="Times New Roman"/>
+                        </a:rPr>
+                        <a:t>Definiert</a:t>
                       </a:r>
-                      <a:endParaRPr lang="en-GB" sz="1200" dirty="0"/>
+                      <a:endParaRPr lang="en-GB" sz="1100">
+                        <a:effectLst/>
+                        <a:latin typeface="Calibri"/>
+                        <a:ea typeface="Calibri"/>
+                        <a:cs typeface="Times New Roman"/>
+                      </a:endParaRPr>
+                    </a:p>
+                    <a:p>
+                      <a:pPr marL="342900" lvl="0" indent="-342900">
+                        <a:lnSpc>
+                          <a:spcPct val="115000"/>
+                        </a:lnSpc>
+                        <a:spcAft>
+                          <a:spcPts val="0"/>
+                        </a:spcAft>
+                        <a:buFont typeface="Symbol"/>
+                        <a:buChar char=""/>
+                      </a:pPr>
+                      <a:r>
+                        <a:rPr lang="de-CH" sz="1100">
+                          <a:effectLst/>
+                          <a:latin typeface="Calibri"/>
+                          <a:ea typeface="Calibri"/>
+                          <a:cs typeface="Times New Roman"/>
+                        </a:rPr>
+                        <a:t>Planung der Iteration</a:t>
+                      </a:r>
+                      <a:endParaRPr lang="en-GB" sz="1100">
+                        <a:effectLst/>
+                        <a:latin typeface="Calibri"/>
+                        <a:ea typeface="Calibri"/>
+                        <a:cs typeface="Times New Roman"/>
+                      </a:endParaRPr>
                     </a:p>
                   </a:txBody>
                   <a:tcPr/>
@@ -9410,15 +9793,85 @@
                     <a:bodyPr/>
                     <a:lstStyle/>
                     <a:p>
+                      <a:pPr marL="342900" lvl="0" indent="-342900">
+                        <a:lnSpc>
+                          <a:spcPct val="115000"/>
+                        </a:lnSpc>
+                        <a:spcAft>
+                          <a:spcPts val="0"/>
+                        </a:spcAft>
+                        <a:buFont typeface="Symbol"/>
+                        <a:buChar char=""/>
+                      </a:pPr>
                       <a:r>
-                        <a:rPr lang="de-CH" sz="1200" dirty="0" smtClean="0"/>
-                        <a:t>Implementieren</a:t>
+                        <a:rPr lang="de-CH" sz="1100">
+                          <a:effectLst/>
+                          <a:latin typeface="Calibri"/>
+                          <a:ea typeface="Calibri"/>
+                          <a:cs typeface="Times New Roman"/>
+                        </a:rPr>
+                        <a:t>Entscheiden</a:t>
                       </a:r>
+                      <a:endParaRPr lang="en-GB" sz="1100">
+                        <a:effectLst/>
+                        <a:latin typeface="Calibri"/>
+                        <a:ea typeface="Calibri"/>
+                        <a:cs typeface="Times New Roman"/>
+                      </a:endParaRPr>
+                    </a:p>
+                    <a:p>
+                      <a:pPr marL="342900" lvl="0" indent="-342900">
+                        <a:lnSpc>
+                          <a:spcPct val="115000"/>
+                        </a:lnSpc>
+                        <a:spcAft>
+                          <a:spcPts val="0"/>
+                        </a:spcAft>
+                        <a:buFont typeface="Symbol"/>
+                        <a:buChar char=""/>
+                      </a:pPr>
                       <a:r>
-                        <a:rPr lang="de-CH" sz="1200" baseline="0" dirty="0" smtClean="0"/>
-                        <a:t> der getroffenen Entscheidungen</a:t>
+                        <a:rPr lang="de-CH" sz="1100">
+                          <a:effectLst/>
+                          <a:latin typeface="Calibri"/>
+                          <a:ea typeface="Calibri"/>
+                          <a:cs typeface="Times New Roman"/>
+                        </a:rPr>
+                        <a:t>Prioritäten für Iteration definieren</a:t>
                       </a:r>
-                      <a:endParaRPr lang="en-GB" sz="1200" dirty="0"/>
+                      <a:endParaRPr lang="en-GB" sz="1100">
+                        <a:effectLst/>
+                        <a:latin typeface="Calibri"/>
+                        <a:ea typeface="Calibri"/>
+                        <a:cs typeface="Times New Roman"/>
+                      </a:endParaRPr>
+                    </a:p>
+                    <a:p>
+                      <a:pPr marL="342900" lvl="0" indent="-342900">
+                        <a:lnSpc>
+                          <a:spcPct val="115000"/>
+                        </a:lnSpc>
+                        <a:spcAft>
+                          <a:spcPts val="0"/>
+                        </a:spcAft>
+                        <a:buFont typeface="Symbol"/>
+                        <a:buChar char=""/>
+                      </a:pPr>
+                      <a:r>
+                        <a:rPr lang="de-CH" sz="1100">
+                          <a:effectLst/>
+                          <a:latin typeface="Calibri"/>
+                          <a:ea typeface="Calibri"/>
+                          <a:cs typeface="Times New Roman"/>
+                        </a:rPr>
+                        <a:t>Planen</a:t>
+                      </a:r>
+                      <a:endParaRPr lang="en-GB" sz="1100">
+                        <a:effectLst/>
+                        <a:latin typeface="Calibri"/>
+                        <a:ea typeface="Calibri"/>
+                        <a:cs typeface="Times New Roman"/>
+                      </a:endParaRPr>
                     </a:p>
                   </a:txBody>
                   <a:tcPr/>
@@ -9428,23 +9881,190 @@
                     <a:bodyPr/>
                     <a:lstStyle/>
                     <a:p>
+                      <a:pPr>
+                        <a:lnSpc>
+                          <a:spcPct val="115000"/>
+                        </a:lnSpc>
+                        <a:spcAft>
+                          <a:spcPts val="0"/>
+                        </a:spcAft>
+                      </a:pPr>
                       <a:r>
-                        <a:rPr lang="de-CH" sz="1200" dirty="0" smtClean="0"/>
-                        <a:t>Neue</a:t>
+                        <a:rPr lang="de-CH" sz="1100">
+                          <a:effectLst/>
+                          <a:latin typeface="Calibri"/>
+                          <a:ea typeface="Calibri"/>
+                          <a:cs typeface="Times New Roman"/>
+                        </a:rPr>
+                        <a:t>Dokumentation und Iterationsplanung</a:t>
                       </a:r>
+                      <a:endParaRPr lang="en-GB" sz="1100">
+                        <a:effectLst/>
+                        <a:latin typeface="Calibri"/>
+                        <a:ea typeface="Calibri"/>
+                        <a:cs typeface="Times New Roman"/>
+                      </a:endParaRPr>
+                    </a:p>
+                  </a:txBody>
+                  <a:tcPr/>
+                </a:tc>
+              </a:tr>
+              <a:tr h="866791">
+                <a:tc>
+                  <a:txBody>
+                    <a:bodyPr/>
+                    <a:lstStyle/>
+                    <a:p>
+                      <a:pPr>
+                        <a:lnSpc>
+                          <a:spcPct val="115000"/>
+                        </a:lnSpc>
+                        <a:spcAft>
+                          <a:spcPts val="0"/>
+                        </a:spcAft>
+                      </a:pPr>
                       <a:r>
-                        <a:rPr lang="de-CH" sz="1200" baseline="0" dirty="0" smtClean="0"/>
-                        <a:t> V</a:t>
+                        <a:rPr lang="de-CH" sz="1100">
+                          <a:effectLst/>
+                          <a:latin typeface="Calibri"/>
+                          <a:ea typeface="Calibri"/>
+                          <a:cs typeface="Times New Roman"/>
+                        </a:rPr>
+                        <a:t>Tasks definieren</a:t>
                       </a:r>
+                      <a:endParaRPr lang="en-GB" sz="1100">
+                        <a:effectLst/>
+                        <a:latin typeface="Calibri"/>
+                        <a:ea typeface="Calibri"/>
+                        <a:cs typeface="Times New Roman"/>
+                      </a:endParaRPr>
+                    </a:p>
+                  </a:txBody>
+                  <a:tcPr/>
+                </a:tc>
+                <a:tc>
+                  <a:txBody>
+                    <a:bodyPr/>
+                    <a:lstStyle/>
+                    <a:p>
+                      <a:pPr marL="342900" lvl="0" indent="-342900">
+                        <a:lnSpc>
+                          <a:spcPct val="115000"/>
+                        </a:lnSpc>
+                        <a:spcAft>
+                          <a:spcPts val="0"/>
+                        </a:spcAft>
+                        <a:buFont typeface="Symbol"/>
+                        <a:buChar char=""/>
+                      </a:pPr>
                       <a:r>
-                        <a:rPr lang="de-CH" sz="1200" dirty="0" smtClean="0"/>
-                        <a:t>ersion des</a:t>
+                        <a:rPr lang="de-CH" sz="1100">
+                          <a:effectLst/>
+                          <a:latin typeface="Calibri"/>
+                          <a:ea typeface="Calibri"/>
+                          <a:cs typeface="Times New Roman"/>
+                        </a:rPr>
+                        <a:t>Tasks für Iteration</a:t>
                       </a:r>
+                      <a:endParaRPr lang="en-GB" sz="1100">
+                        <a:effectLst/>
+                        <a:latin typeface="Calibri"/>
+                        <a:ea typeface="Calibri"/>
+                        <a:cs typeface="Times New Roman"/>
+                      </a:endParaRPr>
+                    </a:p>
+                  </a:txBody>
+                  <a:tcPr/>
+                </a:tc>
+                <a:tc>
+                  <a:txBody>
+                    <a:bodyPr/>
+                    <a:lstStyle/>
+                    <a:p>
+                      <a:pPr marL="342900" lvl="0" indent="-342900">
+                        <a:lnSpc>
+                          <a:spcPct val="115000"/>
+                        </a:lnSpc>
+                        <a:spcAft>
+                          <a:spcPts val="0"/>
+                        </a:spcAft>
+                        <a:buFont typeface="Symbol"/>
+                        <a:buChar char=""/>
+                      </a:pPr>
                       <a:r>
-                        <a:rPr lang="de-CH" sz="1200" baseline="0" dirty="0" smtClean="0"/>
-                        <a:t> Produkts implementiert</a:t>
+                        <a:rPr lang="de-CH" sz="1100">
+                          <a:effectLst/>
+                          <a:latin typeface="Calibri"/>
+                          <a:ea typeface="Calibri"/>
+                          <a:cs typeface="Times New Roman"/>
+                        </a:rPr>
+                        <a:t>Tasks erstellen</a:t>
                       </a:r>
-                      <a:endParaRPr lang="en-GB" sz="1200" dirty="0"/>
+                      <a:endParaRPr lang="en-GB" sz="1100">
+                        <a:effectLst/>
+                        <a:latin typeface="Calibri"/>
+                        <a:ea typeface="Calibri"/>
+                        <a:cs typeface="Times New Roman"/>
+                      </a:endParaRPr>
+                    </a:p>
+                    <a:p>
+                      <a:pPr marL="342900" lvl="0" indent="-342900">
+                        <a:lnSpc>
+                          <a:spcPct val="115000"/>
+                        </a:lnSpc>
+                        <a:spcAft>
+                          <a:spcPts val="0"/>
+                        </a:spcAft>
+                        <a:buFont typeface="Symbol"/>
+                        <a:buChar char=""/>
+                      </a:pPr>
+                      <a:r>
+                        <a:rPr lang="de-CH" sz="1100">
+                          <a:effectLst/>
+                          <a:latin typeface="Calibri"/>
+                          <a:ea typeface="Calibri"/>
+                          <a:cs typeface="Times New Roman"/>
+                        </a:rPr>
+                        <a:t>Prioritäten festlegen</a:t>
+                      </a:r>
+                      <a:endParaRPr lang="en-GB" sz="1100">
+                        <a:effectLst/>
+                        <a:latin typeface="Calibri"/>
+                        <a:ea typeface="Calibri"/>
+                        <a:cs typeface="Times New Roman"/>
+                      </a:endParaRPr>
+                    </a:p>
+                  </a:txBody>
+                  <a:tcPr/>
+                </a:tc>
+                <a:tc>
+                  <a:txBody>
+                    <a:bodyPr/>
+                    <a:lstStyle/>
+                    <a:p>
+                      <a:pPr>
+                        <a:lnSpc>
+                          <a:spcPct val="115000"/>
+                        </a:lnSpc>
+                        <a:spcAft>
+                          <a:spcPts val="0"/>
+                        </a:spcAft>
+                      </a:pPr>
+                      <a:r>
+                        <a:rPr lang="de-CH" sz="1100">
+                          <a:effectLst/>
+                          <a:latin typeface="Calibri"/>
+                          <a:ea typeface="Calibri"/>
+                          <a:cs typeface="Times New Roman"/>
+                        </a:rPr>
+                        <a:t>Tasks zu den User Stories</a:t>
+                      </a:r>
+                      <a:endParaRPr lang="en-GB" sz="1100">
+                        <a:effectLst/>
+                        <a:latin typeface="Calibri"/>
+                        <a:ea typeface="Calibri"/>
+                        <a:cs typeface="Times New Roman"/>
+                      </a:endParaRPr>
                     </a:p>
                   </a:txBody>
                   <a:tcPr/>
@@ -9456,11 +10076,29 @@
                     <a:bodyPr/>
                     <a:lstStyle/>
                     <a:p>
+                      <a:pPr>
+                        <a:lnSpc>
+                          <a:spcPct val="115000"/>
+                        </a:lnSpc>
+                        <a:spcAft>
+                          <a:spcPts val="0"/>
+                        </a:spcAft>
+                      </a:pPr>
                       <a:r>
-                        <a:rPr lang="de-CH" sz="1200" dirty="0" smtClean="0"/>
-                        <a:t>Validation</a:t>
+                        <a:rPr lang="de-CH" sz="1100">
+                          <a:effectLst/>
+                          <a:latin typeface="Calibri"/>
+                          <a:ea typeface="Calibri"/>
+                          <a:cs typeface="Times New Roman"/>
+                        </a:rPr>
+                        <a:t>Entwicklung</a:t>
                       </a:r>
-                      <a:endParaRPr lang="en-GB" sz="1200" dirty="0"/>
+                      <a:endParaRPr lang="en-GB" sz="1100">
+                        <a:effectLst/>
+                        <a:latin typeface="Calibri"/>
+                        <a:ea typeface="Calibri"/>
+                        <a:cs typeface="Times New Roman"/>
+                      </a:endParaRPr>
                     </a:p>
                   </a:txBody>
                   <a:tcPr/>
@@ -9470,11 +10108,31 @@
                     <a:bodyPr/>
                     <a:lstStyle/>
                     <a:p>
+                      <a:pPr marL="342900" lvl="0" indent="-342900">
+                        <a:lnSpc>
+                          <a:spcPct val="115000"/>
+                        </a:lnSpc>
+                        <a:spcAft>
+                          <a:spcPts val="0"/>
+                        </a:spcAft>
+                        <a:buFont typeface="Symbol"/>
+                        <a:buChar char=""/>
+                      </a:pPr>
                       <a:r>
-                        <a:rPr lang="de-CH" sz="1200" dirty="0" smtClean="0"/>
-                        <a:t>Software vom Kunden genehmigt</a:t>
+                        <a:rPr lang="de-CH" sz="1100">
+                          <a:effectLst/>
+                          <a:latin typeface="Calibri"/>
+                          <a:ea typeface="Calibri"/>
+                          <a:cs typeface="Times New Roman"/>
+                        </a:rPr>
+                        <a:t>Software Implementiert</a:t>
                       </a:r>
-                      <a:endParaRPr lang="en-GB" sz="1200" dirty="0"/>
+                      <a:endParaRPr lang="en-GB" sz="1100">
+                        <a:effectLst/>
+                        <a:latin typeface="Calibri"/>
+                        <a:ea typeface="Calibri"/>
+                        <a:cs typeface="Times New Roman"/>
+                      </a:endParaRPr>
                     </a:p>
                   </a:txBody>
                   <a:tcPr/>
@@ -9484,28 +10142,31 @@
                     <a:bodyPr/>
                     <a:lstStyle/>
                     <a:p>
-                      <a:pPr marL="285750" indent="-285750">
-                        <a:buFont typeface="Arial" panose="020B0604020202020204" pitchFamily="34" charset="0"/>
-                        <a:buChar char="•"/>
+                      <a:pPr marL="342900" lvl="0" indent="-342900">
+                        <a:lnSpc>
+                          <a:spcPct val="115000"/>
+                        </a:lnSpc>
+                        <a:spcAft>
+                          <a:spcPts val="0"/>
+                        </a:spcAft>
+                        <a:buFont typeface="Symbol"/>
+                        <a:buChar char=""/>
                       </a:pPr>
                       <a:r>
-                        <a:rPr lang="de-CH" sz="1200" dirty="0" smtClean="0"/>
-                        <a:t>Absprache mit</a:t>
+                        <a:rPr lang="de-CH" sz="1100">
+                          <a:effectLst/>
+                          <a:latin typeface="Calibri"/>
+                          <a:ea typeface="Calibri"/>
+                          <a:cs typeface="Times New Roman"/>
+                        </a:rPr>
+                        <a:t>Implementieren der getroffenen Entscheidungen</a:t>
                       </a:r>
-                      <a:r>
-                        <a:rPr lang="de-CH" sz="1200" baseline="0" dirty="0" smtClean="0"/>
-                        <a:t> Kunden</a:t>
-                      </a:r>
-                    </a:p>
-                    <a:p>
-                      <a:pPr marL="285750" indent="-285750">
-                        <a:buFont typeface="Arial" panose="020B0604020202020204" pitchFamily="34" charset="0"/>
-                        <a:buChar char="•"/>
-                      </a:pPr>
-                      <a:r>
-                        <a:rPr lang="de-CH" sz="1200" baseline="0" dirty="0" smtClean="0"/>
-                        <a:t>Kleinere Änderungen</a:t>
-                      </a:r>
+                      <a:endParaRPr lang="en-GB" sz="1100">
+                        <a:effectLst/>
+                        <a:latin typeface="Calibri"/>
+                        <a:ea typeface="Calibri"/>
+                        <a:cs typeface="Times New Roman"/>
+                      </a:endParaRPr>
                     </a:p>
                   </a:txBody>
                   <a:tcPr/>
@@ -9515,31 +10176,63 @@
                     <a:bodyPr/>
                     <a:lstStyle/>
                     <a:p>
+                      <a:pPr>
+                        <a:lnSpc>
+                          <a:spcPct val="115000"/>
+                        </a:lnSpc>
+                        <a:spcAft>
+                          <a:spcPts val="0"/>
+                        </a:spcAft>
+                      </a:pPr>
                       <a:r>
-                        <a:rPr lang="de-CH" sz="1200" dirty="0" smtClean="0"/>
-                        <a:t>Validierte</a:t>
+                        <a:rPr lang="de-CH" sz="1100">
+                          <a:effectLst/>
+                          <a:latin typeface="Calibri"/>
+                          <a:ea typeface="Calibri"/>
+                          <a:cs typeface="Times New Roman"/>
+                        </a:rPr>
+                        <a:t>Neue Version des Produkts implementiert</a:t>
                       </a:r>
-                      <a:r>
-                        <a:rPr lang="de-CH" sz="1200" baseline="0" dirty="0" smtClean="0"/>
-                        <a:t> Version des Produkts</a:t>
-                      </a:r>
-                      <a:endParaRPr lang="en-GB" sz="1200" dirty="0"/>
+                      <a:endParaRPr lang="en-GB" sz="1100">
+                        <a:effectLst/>
+                        <a:latin typeface="Calibri"/>
+                        <a:ea typeface="Calibri"/>
+                        <a:cs typeface="Times New Roman"/>
+                      </a:endParaRPr>
                     </a:p>
                   </a:txBody>
                   <a:tcPr/>
                 </a:tc>
               </a:tr>
-              <a:tr h="920362">
+              <a:tr h="516673">
                 <a:tc>
                   <a:txBody>
                     <a:bodyPr/>
                     <a:lstStyle/>
                     <a:p>
+                      <a:pPr>
+                        <a:lnSpc>
+                          <a:spcPct val="115000"/>
+                        </a:lnSpc>
+                        <a:spcAft>
+                          <a:spcPts val="0"/>
+                        </a:spcAft>
+                      </a:pPr>
                       <a:r>
-                        <a:rPr lang="de-CH" sz="1200" dirty="0" smtClean="0"/>
+                        <a:rPr lang="de-CH" sz="1100">
+                          <a:effectLst/>
+                          <a:latin typeface="Calibri"/>
+                          <a:ea typeface="Calibri"/>
+                          <a:cs typeface="Times New Roman"/>
+                        </a:rPr>
                         <a:t>Test</a:t>
                       </a:r>
-                      <a:endParaRPr lang="en-GB" sz="1200" dirty="0"/>
+                      <a:endParaRPr lang="en-GB" sz="1100">
+                        <a:effectLst/>
+                        <a:latin typeface="Calibri"/>
+                        <a:ea typeface="Calibri"/>
+                        <a:cs typeface="Times New Roman"/>
+                      </a:endParaRPr>
                     </a:p>
                   </a:txBody>
                   <a:tcPr/>
@@ -9549,15 +10242,31 @@
                     <a:bodyPr/>
                     <a:lstStyle/>
                     <a:p>
+                      <a:pPr marL="342900" lvl="0" indent="-342900">
+                        <a:lnSpc>
+                          <a:spcPct val="115000"/>
+                        </a:lnSpc>
+                        <a:spcAft>
+                          <a:spcPts val="0"/>
+                        </a:spcAft>
+                        <a:buFont typeface="Symbol"/>
+                        <a:buChar char=""/>
+                      </a:pPr>
                       <a:r>
-                        <a:rPr lang="de-CH" sz="1200" dirty="0" smtClean="0"/>
-                        <a:t>Fehlerfreie</a:t>
+                        <a:rPr lang="de-CH" sz="1100">
+                          <a:effectLst/>
+                          <a:latin typeface="Calibri"/>
+                          <a:ea typeface="Calibri"/>
+                          <a:cs typeface="Times New Roman"/>
+                        </a:rPr>
+                        <a:t>Fehlerfreie Software Version</a:t>
                       </a:r>
-                      <a:r>
-                        <a:rPr lang="de-CH" sz="1200" baseline="0" dirty="0" smtClean="0"/>
-                        <a:t> Software Version</a:t>
-                      </a:r>
-                      <a:endParaRPr lang="en-GB" sz="1200" dirty="0"/>
+                      <a:endParaRPr lang="en-GB" sz="1100">
+                        <a:effectLst/>
+                        <a:latin typeface="Calibri"/>
+                        <a:ea typeface="Calibri"/>
+                        <a:cs typeface="Times New Roman"/>
+                      </a:endParaRPr>
                     </a:p>
                   </a:txBody>
                   <a:tcPr/>
@@ -9567,33 +10276,58 @@
                     <a:bodyPr/>
                     <a:lstStyle/>
                     <a:p>
-                      <a:pPr marL="285750" indent="-285750">
-                        <a:buFont typeface="Arial" panose="020B0604020202020204" pitchFamily="34" charset="0"/>
-                        <a:buChar char="•"/>
+                      <a:pPr marL="342900" lvl="0" indent="-342900">
+                        <a:lnSpc>
+                          <a:spcPct val="115000"/>
+                        </a:lnSpc>
+                        <a:spcAft>
+                          <a:spcPts val="0"/>
+                        </a:spcAft>
+                        <a:buFont typeface="Symbol"/>
+                        <a:buChar char=""/>
                       </a:pPr>
                       <a:r>
-                        <a:rPr lang="de-CH" sz="1200" dirty="0" smtClean="0"/>
-                        <a:t>Alle Test</a:t>
+                        <a:rPr lang="de-CH" sz="1100">
+                          <a:effectLst/>
+                          <a:latin typeface="Calibri"/>
+                          <a:ea typeface="Calibri"/>
+                          <a:cs typeface="Times New Roman"/>
+                        </a:rPr>
+                        <a:t>Alle Tests durchführen</a:t>
                       </a:r>
-                      <a:r>
-                        <a:rPr lang="de-CH" sz="1200" baseline="0" dirty="0" smtClean="0"/>
-                        <a:t>s durchführen</a:t>
-                      </a:r>
-                      <a:endParaRPr lang="de-CH" sz="1200" dirty="0" smtClean="0"/>
+                      <a:endParaRPr lang="en-GB" sz="1100">
+                        <a:effectLst/>
+                        <a:latin typeface="Calibri"/>
+                        <a:ea typeface="Calibri"/>
+                        <a:cs typeface="Times New Roman"/>
+                      </a:endParaRPr>
                     </a:p>
                     <a:p>
-                      <a:pPr marL="285750" indent="-285750">
-                        <a:buFont typeface="Arial" panose="020B0604020202020204" pitchFamily="34" charset="0"/>
-                        <a:buChar char="•"/>
+                      <a:pPr marL="342900" lvl="0" indent="-342900">
+                        <a:lnSpc>
+                          <a:spcPct val="115000"/>
+                        </a:lnSpc>
+                        <a:spcAft>
+                          <a:spcPts val="0"/>
+                        </a:spcAft>
+                        <a:buFont typeface="Symbol"/>
+                        <a:buChar char=""/>
                       </a:pPr>
                       <a:r>
-                        <a:rPr lang="de-CH" sz="1200" dirty="0" smtClean="0"/>
-                        <a:t>Vorhandene Fehler</a:t>
+                        <a:rPr lang="de-CH" sz="1100">
+                          <a:effectLst/>
+                          <a:latin typeface="Calibri"/>
+                          <a:ea typeface="Calibri"/>
+                          <a:cs typeface="Times New Roman"/>
+                        </a:rPr>
+                        <a:t>Vorhandene Fehler beheben</a:t>
                       </a:r>
-                      <a:r>
-                        <a:rPr lang="de-CH" sz="1200" baseline="0" dirty="0" smtClean="0"/>
-                        <a:t> beheben</a:t>
-                      </a:r>
+                      <a:endParaRPr lang="en-GB" sz="1100">
+                        <a:effectLst/>
+                        <a:latin typeface="Calibri"/>
+                        <a:ea typeface="Calibri"/>
+                        <a:cs typeface="Times New Roman"/>
+                      </a:endParaRPr>
                     </a:p>
                   </a:txBody>
                   <a:tcPr/>
@@ -9603,11 +10337,190 @@
                     <a:bodyPr/>
                     <a:lstStyle/>
                     <a:p>
+                      <a:pPr>
+                        <a:lnSpc>
+                          <a:spcPct val="115000"/>
+                        </a:lnSpc>
+                        <a:spcAft>
+                          <a:spcPts val="0"/>
+                        </a:spcAft>
+                      </a:pPr>
                       <a:r>
-                        <a:rPr lang="de-CH" sz="1200" dirty="0" smtClean="0"/>
-                        <a:t>Software Version</a:t>
+                        <a:rPr lang="de-CH" sz="1100">
+                          <a:effectLst/>
+                          <a:latin typeface="Calibri"/>
+                          <a:ea typeface="Calibri"/>
+                          <a:cs typeface="Times New Roman"/>
+                        </a:rPr>
+                        <a:t>Getestete Software Version</a:t>
                       </a:r>
-                      <a:endParaRPr lang="en-GB" sz="1200" dirty="0"/>
+                      <a:endParaRPr lang="en-GB" sz="1100">
+                        <a:effectLst/>
+                        <a:latin typeface="Calibri"/>
+                        <a:ea typeface="Calibri"/>
+                        <a:cs typeface="Times New Roman"/>
+                      </a:endParaRPr>
+                    </a:p>
+                  </a:txBody>
+                  <a:tcPr/>
+                </a:tc>
+              </a:tr>
+              <a:tr h="516673">
+                <a:tc>
+                  <a:txBody>
+                    <a:bodyPr/>
+                    <a:lstStyle/>
+                    <a:p>
+                      <a:pPr>
+                        <a:lnSpc>
+                          <a:spcPct val="115000"/>
+                        </a:lnSpc>
+                        <a:spcAft>
+                          <a:spcPts val="0"/>
+                        </a:spcAft>
+                      </a:pPr>
+                      <a:r>
+                        <a:rPr lang="de-CH" sz="1100">
+                          <a:effectLst/>
+                          <a:latin typeface="Calibri"/>
+                          <a:ea typeface="Calibri"/>
+                          <a:cs typeface="Times New Roman"/>
+                        </a:rPr>
+                        <a:t>Validation</a:t>
+                      </a:r>
+                      <a:endParaRPr lang="en-GB" sz="1100">
+                        <a:effectLst/>
+                        <a:latin typeface="Calibri"/>
+                        <a:ea typeface="Calibri"/>
+                        <a:cs typeface="Times New Roman"/>
+                      </a:endParaRPr>
+                    </a:p>
+                  </a:txBody>
+                  <a:tcPr/>
+                </a:tc>
+                <a:tc>
+                  <a:txBody>
+                    <a:bodyPr/>
+                    <a:lstStyle/>
+                    <a:p>
+                      <a:pPr marL="342900" lvl="0" indent="-342900">
+                        <a:lnSpc>
+                          <a:spcPct val="115000"/>
+                        </a:lnSpc>
+                        <a:spcAft>
+                          <a:spcPts val="0"/>
+                        </a:spcAft>
+                        <a:buFont typeface="Symbol"/>
+                        <a:buChar char=""/>
+                      </a:pPr>
+                      <a:r>
+                        <a:rPr lang="de-CH" sz="1100">
+                          <a:effectLst/>
+                          <a:latin typeface="Calibri"/>
+                          <a:ea typeface="Calibri"/>
+                          <a:cs typeface="Times New Roman"/>
+                        </a:rPr>
+                        <a:t>Software vom Kunden genehmigt</a:t>
+                      </a:r>
+                      <a:endParaRPr lang="en-GB" sz="1100">
+                        <a:effectLst/>
+                        <a:latin typeface="Calibri"/>
+                        <a:ea typeface="Calibri"/>
+                        <a:cs typeface="Times New Roman"/>
+                      </a:endParaRPr>
+                    </a:p>
+                  </a:txBody>
+                  <a:tcPr/>
+                </a:tc>
+                <a:tc>
+                  <a:txBody>
+                    <a:bodyPr/>
+                    <a:lstStyle/>
+                    <a:p>
+                      <a:pPr marL="342900" lvl="0" indent="-342900">
+                        <a:lnSpc>
+                          <a:spcPct val="115000"/>
+                        </a:lnSpc>
+                        <a:spcAft>
+                          <a:spcPts val="0"/>
+                        </a:spcAft>
+                        <a:buFont typeface="Symbol"/>
+                        <a:buChar char=""/>
+                      </a:pPr>
+                      <a:r>
+                        <a:rPr lang="de-CH" sz="1100">
+                          <a:effectLst/>
+                          <a:latin typeface="Calibri"/>
+                          <a:ea typeface="Calibri"/>
+                          <a:cs typeface="Times New Roman"/>
+                        </a:rPr>
+                        <a:t>Absprache mit Kunden</a:t>
+                      </a:r>
+                      <a:endParaRPr lang="en-GB" sz="1100">
+                        <a:effectLst/>
+                        <a:latin typeface="Calibri"/>
+                        <a:ea typeface="Calibri"/>
+                        <a:cs typeface="Times New Roman"/>
+                      </a:endParaRPr>
+                    </a:p>
+                    <a:p>
+                      <a:pPr marL="342900" lvl="0" indent="-342900">
+                        <a:lnSpc>
+                          <a:spcPct val="115000"/>
+                        </a:lnSpc>
+                        <a:spcAft>
+                          <a:spcPts val="0"/>
+                        </a:spcAft>
+                        <a:buFont typeface="Symbol"/>
+                        <a:buChar char=""/>
+                      </a:pPr>
+                      <a:r>
+                        <a:rPr lang="de-CH" sz="1100">
+                          <a:effectLst/>
+                          <a:latin typeface="Calibri"/>
+                          <a:ea typeface="Calibri"/>
+                          <a:cs typeface="Times New Roman"/>
+                        </a:rPr>
+                        <a:t>Kleinere Änderungen</a:t>
+                      </a:r>
+                      <a:endParaRPr lang="en-GB" sz="1100">
+                        <a:effectLst/>
+                        <a:latin typeface="Calibri"/>
+                        <a:ea typeface="Calibri"/>
+                        <a:cs typeface="Times New Roman"/>
+                      </a:endParaRPr>
+                    </a:p>
+                  </a:txBody>
+                  <a:tcPr/>
+                </a:tc>
+                <a:tc>
+                  <a:txBody>
+                    <a:bodyPr/>
+                    <a:lstStyle/>
+                    <a:p>
+                      <a:pPr>
+                        <a:lnSpc>
+                          <a:spcPct val="115000"/>
+                        </a:lnSpc>
+                        <a:spcAft>
+                          <a:spcPts val="0"/>
+                        </a:spcAft>
+                      </a:pPr>
+                      <a:r>
+                        <a:rPr lang="de-CH" sz="1100">
+                          <a:effectLst/>
+                          <a:latin typeface="Calibri"/>
+                          <a:ea typeface="Calibri"/>
+                          <a:cs typeface="Times New Roman"/>
+                        </a:rPr>
+                        <a:t>Validierte Version des Produkts</a:t>
+                      </a:r>
+                      <a:endParaRPr lang="en-GB" sz="1100">
+                        <a:effectLst/>
+                        <a:latin typeface="Calibri"/>
+                        <a:ea typeface="Calibri"/>
+                        <a:cs typeface="Times New Roman"/>
+                      </a:endParaRPr>
                     </a:p>
                   </a:txBody>
                   <a:tcPr/>
@@ -9619,16 +10532,39 @@
                     <a:bodyPr/>
                     <a:lstStyle/>
                     <a:p>
-                      <a:pPr algn="ctr"/>
+                      <a:pPr algn="ctr">
+                        <a:lnSpc>
+                          <a:spcPct val="115000"/>
+                        </a:lnSpc>
+                        <a:spcAft>
+                          <a:spcPts val="0"/>
+                        </a:spcAft>
+                      </a:pPr>
                       <a:r>
-                        <a:rPr lang="de-CH" sz="1200" dirty="0" smtClean="0"/>
-                        <a:t>Nächster</a:t>
+                        <a:rPr lang="de-CH" sz="1100">
+                          <a:effectLst/>
+                          <a:latin typeface="Calibri"/>
+                          <a:ea typeface="Calibri"/>
+                          <a:cs typeface="Times New Roman"/>
+                        </a:rPr>
+                        <a:t>Nächster Zyklus erforderlich?</a:t>
                       </a:r>
-                      <a:r>
-                        <a:rPr lang="de-CH" sz="1200" baseline="0" dirty="0" smtClean="0"/>
-                        <a:t> Zyklus erforderlich?</a:t>
-                      </a:r>
-                      <a:endParaRPr lang="en-GB" sz="1200" dirty="0"/>
+                      <a:endParaRPr lang="en-GB" sz="1100">
+                        <a:effectLst/>
+                        <a:latin typeface="Calibri"/>
+                        <a:ea typeface="Calibri"/>
+                        <a:cs typeface="Times New Roman"/>
+                      </a:endParaRPr>
+                    </a:p>
+                  </a:txBody>
+                  <a:tcPr anchor="ctr"/>
+                </a:tc>
+                <a:tc hMerge="1">
+                  <a:txBody>
+                    <a:bodyPr/>
+                    <a:lstStyle/>
+                    <a:p>
+                      <a:endParaRPr lang="de-CH"/>
                     </a:p>
                   </a:txBody>
                   <a:tcPr/>
@@ -9638,7 +10574,7 @@
                     <a:bodyPr/>
                     <a:lstStyle/>
                     <a:p>
-                      <a:endParaRPr lang="en-GB" sz="1600" dirty="0"/>
+                      <a:endParaRPr lang="de-CH"/>
                     </a:p>
                   </a:txBody>
                   <a:tcPr/>
@@ -9648,17 +10584,7 @@
                     <a:bodyPr/>
                     <a:lstStyle/>
                     <a:p>
-                      <a:endParaRPr lang="en-GB" sz="1600" dirty="0"/>
-                    </a:p>
-                  </a:txBody>
-                  <a:tcPr/>
-                </a:tc>
-                <a:tc hMerge="1">
-                  <a:txBody>
-                    <a:bodyPr/>
-                    <a:lstStyle/>
-                    <a:p>
-                      <a:endParaRPr lang="en-GB" sz="1100" dirty="0"/>
+                      <a:endParaRPr lang="de-CH"/>
                     </a:p>
                   </a:txBody>
                   <a:tcPr/>
@@ -9670,16 +10596,37 @@
                     <a:bodyPr/>
                     <a:lstStyle/>
                     <a:p>
+                      <a:pPr>
+                        <a:lnSpc>
+                          <a:spcPct val="115000"/>
+                        </a:lnSpc>
+                        <a:spcAft>
+                          <a:spcPts val="0"/>
+                        </a:spcAft>
+                      </a:pPr>
                       <a:r>
-                        <a:rPr lang="de-CH" sz="1200" dirty="0" smtClean="0"/>
+                        <a:rPr lang="de-CH" sz="1100" dirty="0">
+                          <a:effectLst/>
+                          <a:latin typeface="Calibri"/>
+                          <a:ea typeface="Calibri"/>
+                          <a:cs typeface="Times New Roman"/>
+                        </a:rPr>
                         <a:t>Abschluss</a:t>
                       </a:r>
-                      <a:endParaRPr lang="en-GB" sz="1200" dirty="0"/>
+                      <a:endParaRPr lang="en-GB" sz="1100" dirty="0">
+                        <a:effectLst/>
+                        <a:latin typeface="Calibri"/>
+                        <a:ea typeface="Calibri"/>
+                        <a:cs typeface="Times New Roman"/>
+                      </a:endParaRPr>
                     </a:p>
                   </a:txBody>
                   <a:tcPr>
                     <a:solidFill>
-                      <a:srgbClr val="00B0F0"/>
+                      <a:schemeClr val="accent2">
+                        <a:lumMod val="40000"/>
+                        <a:lumOff val="60000"/>
+                      </a:schemeClr>
                     </a:solidFill>
                   </a:tcPr>
                 </a:tc>
@@ -9688,20 +10635,39 @@
                     <a:bodyPr/>
                     <a:lstStyle/>
                     <a:p>
+                      <a:pPr marL="342900" lvl="0" indent="-342900">
+                        <a:lnSpc>
+                          <a:spcPct val="115000"/>
+                        </a:lnSpc>
+                        <a:spcAft>
+                          <a:spcPts val="0"/>
+                        </a:spcAft>
+                        <a:buFont typeface="Symbol"/>
+                        <a:buChar char=""/>
+                      </a:pPr>
                       <a:r>
-                        <a:rPr lang="de-CH" sz="1200" dirty="0" smtClean="0"/>
-                        <a:t>Produkt Auslieferbereit</a:t>
+                        <a:rPr lang="de-CH" sz="1100" dirty="0">
+                          <a:effectLst/>
+                          <a:latin typeface="Calibri"/>
+                          <a:ea typeface="Calibri"/>
+                          <a:cs typeface="Times New Roman"/>
+                        </a:rPr>
+                        <a:t>Produkt Auslieferbereit und Fehlerfrei</a:t>
                       </a:r>
-                      <a:r>
-                        <a:rPr lang="de-CH" sz="1200" baseline="0" dirty="0" smtClean="0"/>
-                        <a:t> und Fehlerfrei</a:t>
-                      </a:r>
-                      <a:endParaRPr lang="en-GB" sz="1200" dirty="0"/>
+                      <a:endParaRPr lang="en-GB" sz="1100" dirty="0">
+                        <a:effectLst/>
+                        <a:latin typeface="Calibri"/>
+                        <a:ea typeface="Calibri"/>
+                        <a:cs typeface="Times New Roman"/>
+                      </a:endParaRPr>
                     </a:p>
                   </a:txBody>
                   <a:tcPr>
                     <a:solidFill>
-                      <a:srgbClr val="00B0F0"/>
+                      <a:schemeClr val="accent2">
+                        <a:lumMod val="40000"/>
+                        <a:lumOff val="60000"/>
+                      </a:schemeClr>
                     </a:solidFill>
                   </a:tcPr>
                 </a:tc>
@@ -9710,20 +10676,39 @@
                     <a:bodyPr/>
                     <a:lstStyle/>
                     <a:p>
+                      <a:pPr marL="342900" lvl="0" indent="-342900">
+                        <a:lnSpc>
+                          <a:spcPct val="115000"/>
+                        </a:lnSpc>
+                        <a:spcAft>
+                          <a:spcPts val="0"/>
+                        </a:spcAft>
+                        <a:buFont typeface="Symbol"/>
+                        <a:buChar char=""/>
+                      </a:pPr>
                       <a:r>
-                        <a:rPr lang="de-CH" sz="1200" dirty="0" smtClean="0"/>
-                        <a:t>Endgültiges Produkt definieren</a:t>
+                        <a:rPr lang="de-CH" sz="1100">
+                          <a:effectLst/>
+                          <a:latin typeface="Calibri"/>
+                          <a:ea typeface="Calibri"/>
+                          <a:cs typeface="Times New Roman"/>
+                        </a:rPr>
+                        <a:t>Endgültiges Produkt definieren </a:t>
                       </a:r>
-                      <a:r>
-                        <a:rPr lang="de-CH" sz="1200" baseline="0" dirty="0" smtClean="0"/>
-                        <a:t> </a:t>
-                      </a:r>
-                      <a:endParaRPr lang="en-GB" sz="1200" dirty="0"/>
+                      <a:endParaRPr lang="en-GB" sz="1100">
+                        <a:effectLst/>
+                        <a:latin typeface="Calibri"/>
+                        <a:ea typeface="Calibri"/>
+                        <a:cs typeface="Times New Roman"/>
+                      </a:endParaRPr>
                     </a:p>
                   </a:txBody>
                   <a:tcPr>
                     <a:solidFill>
-                      <a:srgbClr val="00B0F0"/>
+                      <a:schemeClr val="accent2">
+                        <a:lumMod val="40000"/>
+                        <a:lumOff val="60000"/>
+                      </a:schemeClr>
                     </a:solidFill>
                   </a:tcPr>
                 </a:tc>
@@ -9732,16 +10717,37 @@
                     <a:bodyPr/>
                     <a:lstStyle/>
                     <a:p>
+                      <a:pPr>
+                        <a:lnSpc>
+                          <a:spcPct val="115000"/>
+                        </a:lnSpc>
+                        <a:spcAft>
+                          <a:spcPts val="0"/>
+                        </a:spcAft>
+                      </a:pPr>
                       <a:r>
-                        <a:rPr lang="de-CH" sz="1200" dirty="0" smtClean="0"/>
+                        <a:rPr lang="de-CH" sz="1100" dirty="0">
+                          <a:effectLst/>
+                          <a:latin typeface="Calibri"/>
+                          <a:ea typeface="Calibri"/>
+                          <a:cs typeface="Times New Roman"/>
+                        </a:rPr>
                         <a:t>Endgültige Software</a:t>
                       </a:r>
-                      <a:endParaRPr lang="en-GB" sz="1200" dirty="0"/>
+                      <a:endParaRPr lang="en-GB" sz="1100" dirty="0">
+                        <a:effectLst/>
+                        <a:latin typeface="Calibri"/>
+                        <a:ea typeface="Calibri"/>
+                        <a:cs typeface="Times New Roman"/>
+                      </a:endParaRPr>
                     </a:p>
                   </a:txBody>
                   <a:tcPr>
                     <a:solidFill>
-                      <a:srgbClr val="00B0F0"/>
+                      <a:schemeClr val="accent2">
+                        <a:lumMod val="40000"/>
+                        <a:lumOff val="60000"/>
+                      </a:schemeClr>
                     </a:solidFill>
                   </a:tcPr>
                 </a:tc>
@@ -9760,13 +10766,13 @@
   <p:clrMapOvr>
     <a:masterClrMapping/>
   </p:clrMapOvr>
-  <mc:AlternateContent xmlns:mc="http://schemas.openxmlformats.org/markup-compatibility/2006" xmlns:p14="http://schemas.microsoft.com/office/powerpoint/2010/main">
-    <mc:Choice Requires="p14">
+  <mc:AlternateContent xmlns:mc="http://schemas.openxmlformats.org/markup-compatibility/2006">
+    <mc:Choice xmlns:p14="http://schemas.microsoft.com/office/powerpoint/2010/main" Requires="p14">
       <p:transition spd="med" p14:dur="700">
         <p:fade/>
       </p:transition>
     </mc:Choice>
-    <mc:Fallback xmlns="">
+    <mc:Fallback>
       <p:transition spd="med">
         <p:fade/>
       </p:transition>
@@ -9811,7 +10817,7 @@
         </p:nvSpPr>
         <p:spPr>
           <a:xfrm>
-            <a:off x="1291167" y="546274"/>
+            <a:off x="1291167" y="276274"/>
             <a:ext cx="7010142" cy="540000"/>
           </a:xfrm>
         </p:spPr>
@@ -9829,764 +10835,58 @@
           </a:p>
         </p:txBody>
       </p:sp>
-      <p:sp>
-        <p:nvSpPr>
-          <p:cNvPr id="2" name="Rechteck 1"/>
-          <p:cNvSpPr/>
+      <p:pic>
+        <p:nvPicPr>
+          <p:cNvPr id="1026" name="Picture 2"/>
+          <p:cNvPicPr>
+            <a:picLocks noChangeAspect="1" noChangeArrowheads="1"/>
+          </p:cNvPicPr>
           <p:nvPr/>
-        </p:nvSpPr>
-        <p:spPr>
+        </p:nvPicPr>
+        <p:blipFill rotWithShape="1">
+          <a:blip r:embed="rId3">
+            <a:extLst>
+              <a:ext uri="{28A0092B-C50C-407E-A947-70E740481C1C}">
+                <a14:useLocalDpi xmlns:a14="http://schemas.microsoft.com/office/drawing/2010/main" val="0"/>
+              </a:ext>
+            </a:extLst>
+          </a:blip>
+          <a:srcRect l="30049" t="15863" r="27259" b="14264"/>
+          <a:stretch/>
+        </p:blipFill>
+        <p:spPr bwMode="auto">
           <a:xfrm>
-            <a:off x="1763487" y="1598375"/>
-            <a:ext cx="1578428" cy="620486"/>
+            <a:off x="1194451" y="760965"/>
+            <a:ext cx="6439212" cy="5525541"/>
           </a:xfrm>
           <a:prstGeom prst="rect">
             <a:avLst/>
           </a:prstGeom>
           <a:noFill/>
           <a:ln>
-            <a:solidFill>
-              <a:schemeClr val="tx1"/>
-            </a:solidFill>
+            <a:noFill/>
           </a:ln>
+          <a:extLst>
+            <a:ext uri="{909E8E84-426E-40DD-AFC4-6F175D3DCCD1}">
+              <a14:hiddenFill xmlns:a14="http://schemas.microsoft.com/office/drawing/2010/main">
+                <a:solidFill>
+                  <a:schemeClr val="accent1"/>
+                </a:solidFill>
+              </a14:hiddenFill>
+            </a:ext>
+            <a:ext uri="{91240B29-F687-4F45-9708-019B960494DF}">
+              <a14:hiddenLine xmlns:a14="http://schemas.microsoft.com/office/drawing/2010/main" w="9525">
+                <a:solidFill>
+                  <a:schemeClr val="tx1"/>
+                </a:solidFill>
+                <a:miter lim="800000"/>
+                <a:headEnd/>
+                <a:tailEnd/>
+              </a14:hiddenLine>
+            </a:ext>
+          </a:extLst>
         </p:spPr>
-        <p:style>
-          <a:lnRef idx="1">
-            <a:schemeClr val="accent1"/>
-          </a:lnRef>
-          <a:fillRef idx="3">
-            <a:schemeClr val="accent1"/>
-          </a:fillRef>
-          <a:effectRef idx="2">
-            <a:schemeClr val="accent1"/>
-          </a:effectRef>
-          <a:fontRef idx="minor">
-            <a:schemeClr val="lt1"/>
-          </a:fontRef>
-        </p:style>
-        <p:txBody>
-          <a:bodyPr rtlCol="0" anchor="ctr"/>
-          <a:lstStyle/>
-          <a:p>
-            <a:pPr algn="ctr"/>
-            <a:r>
-              <a:rPr lang="de-CH" sz="1400" dirty="0">
-                <a:solidFill>
-                  <a:schemeClr val="tx1"/>
-                </a:solidFill>
-              </a:rPr>
-              <a:t>Dokumentation und </a:t>
-            </a:r>
-            <a:r>
-              <a:rPr lang="de-CH" sz="1400" dirty="0" smtClean="0">
-                <a:solidFill>
-                  <a:schemeClr val="tx1"/>
-                </a:solidFill>
-              </a:rPr>
-              <a:t>Planung</a:t>
-            </a:r>
-            <a:endParaRPr lang="en-GB" sz="1400" dirty="0">
-              <a:solidFill>
-                <a:schemeClr val="tx1"/>
-              </a:solidFill>
-            </a:endParaRPr>
-          </a:p>
-        </p:txBody>
-      </p:sp>
-      <p:sp>
-        <p:nvSpPr>
-          <p:cNvPr id="7" name="Rechteck 6"/>
-          <p:cNvSpPr/>
-          <p:nvPr/>
-        </p:nvSpPr>
-        <p:spPr>
-          <a:xfrm>
-            <a:off x="1763487" y="2360378"/>
-            <a:ext cx="1578428" cy="620486"/>
-          </a:xfrm>
-          <a:prstGeom prst="rect">
-            <a:avLst/>
-          </a:prstGeom>
-          <a:noFill/>
-          <a:ln>
-            <a:solidFill>
-              <a:schemeClr val="tx1"/>
-            </a:solidFill>
-          </a:ln>
-        </p:spPr>
-        <p:style>
-          <a:lnRef idx="1">
-            <a:schemeClr val="accent1"/>
-          </a:lnRef>
-          <a:fillRef idx="3">
-            <a:schemeClr val="accent1"/>
-          </a:fillRef>
-          <a:effectRef idx="2">
-            <a:schemeClr val="accent1"/>
-          </a:effectRef>
-          <a:fontRef idx="minor">
-            <a:schemeClr val="lt1"/>
-          </a:fontRef>
-        </p:style>
-        <p:txBody>
-          <a:bodyPr rtlCol="0" anchor="ctr"/>
-          <a:lstStyle/>
-          <a:p>
-            <a:pPr algn="ctr"/>
-            <a:r>
-              <a:rPr lang="de-CH" sz="1400" dirty="0">
-                <a:solidFill>
-                  <a:schemeClr val="tx1"/>
-                </a:solidFill>
-              </a:rPr>
-              <a:t>Neue Version des </a:t>
-            </a:r>
-            <a:r>
-              <a:rPr lang="de-CH" sz="1400" dirty="0" smtClean="0">
-                <a:solidFill>
-                  <a:schemeClr val="tx1"/>
-                </a:solidFill>
-              </a:rPr>
-              <a:t>Produkts implementiert</a:t>
-            </a:r>
-            <a:endParaRPr lang="en-GB" sz="1400" dirty="0">
-              <a:solidFill>
-                <a:schemeClr val="tx1"/>
-              </a:solidFill>
-            </a:endParaRPr>
-          </a:p>
-        </p:txBody>
-      </p:sp>
-      <p:sp>
-        <p:nvSpPr>
-          <p:cNvPr id="8" name="Rechteck 7"/>
-          <p:cNvSpPr/>
-          <p:nvPr/>
-        </p:nvSpPr>
-        <p:spPr>
-          <a:xfrm>
-            <a:off x="1755323" y="3122908"/>
-            <a:ext cx="1578428" cy="620486"/>
-          </a:xfrm>
-          <a:prstGeom prst="rect">
-            <a:avLst/>
-          </a:prstGeom>
-          <a:noFill/>
-          <a:ln>
-            <a:solidFill>
-              <a:schemeClr val="tx1"/>
-            </a:solidFill>
-          </a:ln>
-        </p:spPr>
-        <p:style>
-          <a:lnRef idx="1">
-            <a:schemeClr val="accent1"/>
-          </a:lnRef>
-          <a:fillRef idx="3">
-            <a:schemeClr val="accent1"/>
-          </a:fillRef>
-          <a:effectRef idx="2">
-            <a:schemeClr val="accent1"/>
-          </a:effectRef>
-          <a:fontRef idx="minor">
-            <a:schemeClr val="lt1"/>
-          </a:fontRef>
-        </p:style>
-        <p:txBody>
-          <a:bodyPr rtlCol="0" anchor="ctr"/>
-          <a:lstStyle/>
-          <a:p>
-            <a:pPr algn="ctr"/>
-            <a:r>
-              <a:rPr lang="de-CH" sz="1400" dirty="0">
-                <a:solidFill>
-                  <a:schemeClr val="tx1"/>
-                </a:solidFill>
-              </a:rPr>
-              <a:t>Validierte Version des Produkts</a:t>
-            </a:r>
-            <a:endParaRPr lang="en-GB" sz="1400" dirty="0">
-              <a:solidFill>
-                <a:schemeClr val="tx1"/>
-              </a:solidFill>
-            </a:endParaRPr>
-          </a:p>
-        </p:txBody>
-      </p:sp>
-      <p:sp>
-        <p:nvSpPr>
-          <p:cNvPr id="9" name="Rechteck 8"/>
-          <p:cNvSpPr/>
-          <p:nvPr/>
-        </p:nvSpPr>
-        <p:spPr>
-          <a:xfrm>
-            <a:off x="1763487" y="3880240"/>
-            <a:ext cx="1578428" cy="620486"/>
-          </a:xfrm>
-          <a:prstGeom prst="rect">
-            <a:avLst/>
-          </a:prstGeom>
-          <a:noFill/>
-          <a:ln>
-            <a:solidFill>
-              <a:schemeClr val="tx1"/>
-            </a:solidFill>
-          </a:ln>
-        </p:spPr>
-        <p:style>
-          <a:lnRef idx="1">
-            <a:schemeClr val="accent1"/>
-          </a:lnRef>
-          <a:fillRef idx="3">
-            <a:schemeClr val="accent1"/>
-          </a:fillRef>
-          <a:effectRef idx="2">
-            <a:schemeClr val="accent1"/>
-          </a:effectRef>
-          <a:fontRef idx="minor">
-            <a:schemeClr val="lt1"/>
-          </a:fontRef>
-        </p:style>
-        <p:txBody>
-          <a:bodyPr rtlCol="0" anchor="ctr"/>
-          <a:lstStyle/>
-          <a:p>
-            <a:pPr algn="ctr"/>
-            <a:r>
-              <a:rPr lang="de-CH" sz="1400" dirty="0" smtClean="0">
-                <a:solidFill>
-                  <a:schemeClr val="tx1"/>
-                </a:solidFill>
-              </a:rPr>
-              <a:t>Software </a:t>
-            </a:r>
-            <a:r>
-              <a:rPr lang="de-CH" sz="1400" dirty="0">
-                <a:solidFill>
-                  <a:schemeClr val="tx1"/>
-                </a:solidFill>
-              </a:rPr>
-              <a:t>Version</a:t>
-            </a:r>
-            <a:endParaRPr lang="en-GB" sz="1400" dirty="0">
-              <a:solidFill>
-                <a:schemeClr val="tx1"/>
-              </a:solidFill>
-            </a:endParaRPr>
-          </a:p>
-        </p:txBody>
-      </p:sp>
-      <p:sp>
-        <p:nvSpPr>
-          <p:cNvPr id="10" name="Rechteck 9"/>
-          <p:cNvSpPr/>
-          <p:nvPr/>
-        </p:nvSpPr>
-        <p:spPr>
-          <a:xfrm>
-            <a:off x="974273" y="1118931"/>
-            <a:ext cx="2966356" cy="4251779"/>
-          </a:xfrm>
-          <a:prstGeom prst="rect">
-            <a:avLst/>
-          </a:prstGeom>
-          <a:noFill/>
-          <a:ln>
-            <a:solidFill>
-              <a:schemeClr val="tx1"/>
-            </a:solidFill>
-          </a:ln>
-        </p:spPr>
-        <p:style>
-          <a:lnRef idx="1">
-            <a:schemeClr val="accent1"/>
-          </a:lnRef>
-          <a:fillRef idx="3">
-            <a:schemeClr val="accent1"/>
-          </a:fillRef>
-          <a:effectRef idx="2">
-            <a:schemeClr val="accent1"/>
-          </a:effectRef>
-          <a:fontRef idx="minor">
-            <a:schemeClr val="lt1"/>
-          </a:fontRef>
-        </p:style>
-        <p:txBody>
-          <a:bodyPr rtlCol="0" anchor="ctr"/>
-          <a:lstStyle/>
-          <a:p>
-            <a:pPr algn="ctr"/>
-            <a:endParaRPr lang="en-GB" dirty="0"/>
-          </a:p>
-        </p:txBody>
-      </p:sp>
-      <p:sp>
-        <p:nvSpPr>
-          <p:cNvPr id="11" name="Textfeld 10"/>
-          <p:cNvSpPr txBox="1"/>
-          <p:nvPr/>
-        </p:nvSpPr>
-        <p:spPr>
-          <a:xfrm>
-            <a:off x="974273" y="1086274"/>
-            <a:ext cx="1725386" cy="461665"/>
-          </a:xfrm>
-          <a:prstGeom prst="rect">
-            <a:avLst/>
-          </a:prstGeom>
-          <a:noFill/>
-        </p:spPr>
-        <p:txBody>
-          <a:bodyPr wrap="square" rtlCol="0">
-            <a:spAutoFit/>
-          </a:bodyPr>
-          <a:lstStyle/>
-          <a:p>
-            <a:r>
-              <a:rPr lang="de-DE" sz="2400" kern="1200" dirty="0" smtClean="0">
-                <a:solidFill>
-                  <a:schemeClr val="tx1"/>
-                </a:solidFill>
-                <a:latin typeface="Calibri" pitchFamily="34" charset="0"/>
-                <a:ea typeface="MS PGothic" pitchFamily="34" charset="-128"/>
-                <a:cs typeface="+mn-cs"/>
-              </a:rPr>
-              <a:t>Iteration</a:t>
-            </a:r>
-            <a:endParaRPr lang="de-DE" sz="2400" kern="1200" dirty="0">
-              <a:solidFill>
-                <a:schemeClr val="tx1"/>
-              </a:solidFill>
-              <a:latin typeface="Calibri" pitchFamily="34" charset="0"/>
-              <a:ea typeface="MS PGothic" pitchFamily="34" charset="-128"/>
-              <a:cs typeface="+mn-cs"/>
-            </a:endParaRPr>
-          </a:p>
-        </p:txBody>
-      </p:sp>
-      <p:cxnSp>
-        <p:nvCxnSpPr>
-          <p:cNvPr id="13" name="Gewinkelte Verbindung 12"/>
-          <p:cNvCxnSpPr>
-            <a:stCxn id="28" idx="1"/>
-            <a:endCxn id="2" idx="1"/>
-          </p:cNvCxnSpPr>
-          <p:nvPr/>
-        </p:nvCxnSpPr>
-        <p:spPr>
-          <a:xfrm rot="10800000" flipH="1">
-            <a:off x="1755323" y="1908618"/>
-            <a:ext cx="8164" cy="3013668"/>
-          </a:xfrm>
-          <a:prstGeom prst="bentConnector3">
-            <a:avLst>
-              <a:gd name="adj1" fmla="val -2800098"/>
-            </a:avLst>
-          </a:prstGeom>
-          <a:ln w="38100">
-            <a:tailEnd type="triangle"/>
-          </a:ln>
-        </p:spPr>
-        <p:style>
-          <a:lnRef idx="2">
-            <a:schemeClr val="accent1"/>
-          </a:lnRef>
-          <a:fillRef idx="0">
-            <a:schemeClr val="accent1"/>
-          </a:fillRef>
-          <a:effectRef idx="1">
-            <a:schemeClr val="accent1"/>
-          </a:effectRef>
-          <a:fontRef idx="minor">
-            <a:schemeClr val="tx1"/>
-          </a:fontRef>
-        </p:style>
-      </p:cxnSp>
-      <p:sp>
-        <p:nvSpPr>
-          <p:cNvPr id="18" name="Rechteck 17"/>
-          <p:cNvSpPr/>
-          <p:nvPr/>
-        </p:nvSpPr>
-        <p:spPr>
-          <a:xfrm>
-            <a:off x="1763487" y="5464269"/>
-            <a:ext cx="1578428" cy="620486"/>
-          </a:xfrm>
-          <a:prstGeom prst="rect">
-            <a:avLst/>
-          </a:prstGeom>
-          <a:noFill/>
-          <a:ln>
-            <a:solidFill>
-              <a:schemeClr val="tx1"/>
-            </a:solidFill>
-          </a:ln>
-        </p:spPr>
-        <p:style>
-          <a:lnRef idx="1">
-            <a:schemeClr val="accent1"/>
-          </a:lnRef>
-          <a:fillRef idx="3">
-            <a:schemeClr val="accent1"/>
-          </a:fillRef>
-          <a:effectRef idx="2">
-            <a:schemeClr val="accent1"/>
-          </a:effectRef>
-          <a:fontRef idx="minor">
-            <a:schemeClr val="lt1"/>
-          </a:fontRef>
-        </p:style>
-        <p:txBody>
-          <a:bodyPr rtlCol="0" anchor="ctr"/>
-          <a:lstStyle/>
-          <a:p>
-            <a:pPr algn="ctr"/>
-            <a:r>
-              <a:rPr lang="de-CH" sz="1400" dirty="0" smtClean="0">
-                <a:solidFill>
-                  <a:schemeClr val="tx1"/>
-                </a:solidFill>
-              </a:rPr>
-              <a:t>Endgültige Software</a:t>
-            </a:r>
-            <a:endParaRPr lang="en-GB" sz="1400" dirty="0">
-              <a:solidFill>
-                <a:schemeClr val="tx1"/>
-              </a:solidFill>
-            </a:endParaRPr>
-          </a:p>
-        </p:txBody>
-      </p:sp>
-      <p:sp>
-        <p:nvSpPr>
-          <p:cNvPr id="20" name="Geschweifte Klammer rechts 19"/>
-          <p:cNvSpPr/>
-          <p:nvPr/>
-        </p:nvSpPr>
-        <p:spPr>
-          <a:xfrm>
-            <a:off x="4557484" y="2662272"/>
-            <a:ext cx="346529" cy="885141"/>
-          </a:xfrm>
-          <a:prstGeom prst="rightBrace">
-            <a:avLst/>
-          </a:prstGeom>
-        </p:spPr>
-        <p:style>
-          <a:lnRef idx="2">
-            <a:schemeClr val="accent1"/>
-          </a:lnRef>
-          <a:fillRef idx="0">
-            <a:schemeClr val="accent1"/>
-          </a:fillRef>
-          <a:effectRef idx="1">
-            <a:schemeClr val="accent1"/>
-          </a:effectRef>
-          <a:fontRef idx="minor">
-            <a:schemeClr val="tx1"/>
-          </a:fontRef>
-        </p:style>
-        <p:txBody>
-          <a:bodyPr rtlCol="0" anchor="ctr"/>
-          <a:lstStyle/>
-          <a:p>
-            <a:pPr algn="ctr"/>
-            <a:endParaRPr lang="en-GB"/>
-          </a:p>
-        </p:txBody>
-      </p:sp>
-      <p:sp>
-        <p:nvSpPr>
-          <p:cNvPr id="21" name="Geschweifte Klammer rechts 20"/>
-          <p:cNvSpPr/>
-          <p:nvPr/>
-        </p:nvSpPr>
-        <p:spPr>
-          <a:xfrm>
-            <a:off x="4114800" y="3485726"/>
-            <a:ext cx="424542" cy="819574"/>
-          </a:xfrm>
-          <a:prstGeom prst="rightBrace">
-            <a:avLst/>
-          </a:prstGeom>
-        </p:spPr>
-        <p:style>
-          <a:lnRef idx="2">
-            <a:schemeClr val="accent1"/>
-          </a:lnRef>
-          <a:fillRef idx="0">
-            <a:schemeClr val="accent1"/>
-          </a:fillRef>
-          <a:effectRef idx="1">
-            <a:schemeClr val="accent1"/>
-          </a:effectRef>
-          <a:fontRef idx="minor">
-            <a:schemeClr val="tx1"/>
-          </a:fontRef>
-        </p:style>
-        <p:txBody>
-          <a:bodyPr rtlCol="0" anchor="ctr"/>
-          <a:lstStyle/>
-          <a:p>
-            <a:pPr algn="ctr"/>
-            <a:endParaRPr lang="en-GB"/>
-          </a:p>
-        </p:txBody>
-      </p:sp>
-      <p:sp>
-        <p:nvSpPr>
-          <p:cNvPr id="22" name="Geschweifte Klammer rechts 21"/>
-          <p:cNvSpPr/>
-          <p:nvPr/>
-        </p:nvSpPr>
-        <p:spPr>
-          <a:xfrm>
-            <a:off x="4131127" y="1777131"/>
-            <a:ext cx="368300" cy="1079500"/>
-          </a:xfrm>
-          <a:prstGeom prst="rightBrace">
-            <a:avLst/>
-          </a:prstGeom>
-        </p:spPr>
-        <p:style>
-          <a:lnRef idx="2">
-            <a:schemeClr val="accent1"/>
-          </a:lnRef>
-          <a:fillRef idx="0">
-            <a:schemeClr val="accent1"/>
-          </a:fillRef>
-          <a:effectRef idx="1">
-            <a:schemeClr val="accent1"/>
-          </a:effectRef>
-          <a:fontRef idx="minor">
-            <a:schemeClr val="tx1"/>
-          </a:fontRef>
-        </p:style>
-        <p:txBody>
-          <a:bodyPr rtlCol="0" anchor="ctr"/>
-          <a:lstStyle/>
-          <a:p>
-            <a:pPr algn="ctr"/>
-            <a:endParaRPr lang="en-GB"/>
-          </a:p>
-        </p:txBody>
-      </p:sp>
-      <p:sp>
-        <p:nvSpPr>
-          <p:cNvPr id="23" name="Textfeld 22"/>
-          <p:cNvSpPr txBox="1"/>
-          <p:nvPr/>
-        </p:nvSpPr>
-        <p:spPr>
-          <a:xfrm>
-            <a:off x="4499427" y="2178344"/>
-            <a:ext cx="3809954" cy="276999"/>
-          </a:xfrm>
-          <a:prstGeom prst="rect">
-            <a:avLst/>
-          </a:prstGeom>
-          <a:noFill/>
-        </p:spPr>
-        <p:txBody>
-          <a:bodyPr wrap="none" rtlCol="0">
-            <a:spAutoFit/>
-          </a:bodyPr>
-          <a:lstStyle/>
-          <a:p>
-            <a:r>
-              <a:rPr lang="de-CH" sz="1200" dirty="0" smtClean="0"/>
-              <a:t>Spezifikation des Produktes für die Implementationsphase</a:t>
-            </a:r>
-            <a:endParaRPr lang="en-GB" sz="1200" dirty="0"/>
-          </a:p>
-        </p:txBody>
-      </p:sp>
-      <p:sp>
-        <p:nvSpPr>
-          <p:cNvPr id="24" name="Textfeld 23"/>
-          <p:cNvSpPr txBox="1"/>
-          <p:nvPr/>
-        </p:nvSpPr>
-        <p:spPr>
-          <a:xfrm>
-            <a:off x="4925784" y="2966342"/>
-            <a:ext cx="3877728" cy="276999"/>
-          </a:xfrm>
-          <a:prstGeom prst="rect">
-            <a:avLst/>
-          </a:prstGeom>
-          <a:noFill/>
-        </p:spPr>
-        <p:txBody>
-          <a:bodyPr wrap="none" rtlCol="0">
-            <a:spAutoFit/>
-          </a:bodyPr>
-          <a:lstStyle/>
-          <a:p>
-            <a:r>
-              <a:rPr lang="de-CH" sz="1200" dirty="0" smtClean="0"/>
-              <a:t>Präsentierfähige Software für die Validierung durch Kunden</a:t>
-            </a:r>
-            <a:endParaRPr lang="en-GB" sz="1200" dirty="0"/>
-          </a:p>
-        </p:txBody>
-      </p:sp>
-      <p:sp>
-        <p:nvSpPr>
-          <p:cNvPr id="25" name="Textfeld 24"/>
-          <p:cNvSpPr txBox="1"/>
-          <p:nvPr/>
-        </p:nvSpPr>
-        <p:spPr>
-          <a:xfrm>
-            <a:off x="4581068" y="3757013"/>
-            <a:ext cx="2882392" cy="276999"/>
-          </a:xfrm>
-          <a:prstGeom prst="rect">
-            <a:avLst/>
-          </a:prstGeom>
-          <a:noFill/>
-        </p:spPr>
-        <p:txBody>
-          <a:bodyPr wrap="none" rtlCol="0">
-            <a:spAutoFit/>
-          </a:bodyPr>
-          <a:lstStyle/>
-          <a:p>
-            <a:r>
-              <a:rPr lang="de-CH" sz="1200" dirty="0" smtClean="0"/>
-              <a:t>Rückmeldung des Kunden berücksichtigen  </a:t>
-            </a:r>
-            <a:endParaRPr lang="en-GB" sz="1200" dirty="0"/>
-          </a:p>
-        </p:txBody>
-      </p:sp>
-      <p:sp>
-        <p:nvSpPr>
-          <p:cNvPr id="26" name="Geschweifte Klammer rechts 25"/>
-          <p:cNvSpPr/>
-          <p:nvPr/>
-        </p:nvSpPr>
-        <p:spPr>
-          <a:xfrm>
-            <a:off x="4479471" y="4190484"/>
-            <a:ext cx="424542" cy="1778516"/>
-          </a:xfrm>
-          <a:prstGeom prst="rightBrace">
-            <a:avLst/>
-          </a:prstGeom>
-        </p:spPr>
-        <p:style>
-          <a:lnRef idx="2">
-            <a:schemeClr val="accent1"/>
-          </a:lnRef>
-          <a:fillRef idx="0">
-            <a:schemeClr val="accent1"/>
-          </a:fillRef>
-          <a:effectRef idx="1">
-            <a:schemeClr val="accent1"/>
-          </a:effectRef>
-          <a:fontRef idx="minor">
-            <a:schemeClr val="tx1"/>
-          </a:fontRef>
-        </p:style>
-        <p:txBody>
-          <a:bodyPr rtlCol="0" anchor="ctr"/>
-          <a:lstStyle/>
-          <a:p>
-            <a:pPr algn="ctr"/>
-            <a:endParaRPr lang="en-GB"/>
-          </a:p>
-        </p:txBody>
-      </p:sp>
-      <p:sp>
-        <p:nvSpPr>
-          <p:cNvPr id="27" name="Textfeld 26"/>
-          <p:cNvSpPr txBox="1"/>
-          <p:nvPr/>
-        </p:nvSpPr>
-        <p:spPr>
-          <a:xfrm>
-            <a:off x="4963208" y="4955211"/>
-            <a:ext cx="4063292" cy="276999"/>
-          </a:xfrm>
-          <a:prstGeom prst="rect">
-            <a:avLst/>
-          </a:prstGeom>
-          <a:noFill/>
-        </p:spPr>
-        <p:txBody>
-          <a:bodyPr wrap="none" rtlCol="0">
-            <a:spAutoFit/>
-          </a:bodyPr>
-          <a:lstStyle/>
-          <a:p>
-            <a:r>
-              <a:rPr lang="de-CH" sz="1200" dirty="0" smtClean="0"/>
-              <a:t>Wichtigste Änderungen übernommen, Software funktionsfähig</a:t>
-            </a:r>
-            <a:endParaRPr lang="en-GB" sz="1200" dirty="0"/>
-          </a:p>
-        </p:txBody>
-      </p:sp>
-      <p:sp>
-        <p:nvSpPr>
-          <p:cNvPr id="28" name="Rechteck 27"/>
-          <p:cNvSpPr/>
-          <p:nvPr/>
-        </p:nvSpPr>
-        <p:spPr>
-          <a:xfrm>
-            <a:off x="1755323" y="4637572"/>
-            <a:ext cx="1578428" cy="569428"/>
-          </a:xfrm>
-          <a:prstGeom prst="rect">
-            <a:avLst/>
-          </a:prstGeom>
-          <a:noFill/>
-          <a:ln>
-            <a:solidFill>
-              <a:schemeClr val="tx1"/>
-            </a:solidFill>
-          </a:ln>
-        </p:spPr>
-        <p:style>
-          <a:lnRef idx="1">
-            <a:schemeClr val="accent1"/>
-          </a:lnRef>
-          <a:fillRef idx="3">
-            <a:schemeClr val="accent1"/>
-          </a:fillRef>
-          <a:effectRef idx="2">
-            <a:schemeClr val="accent1"/>
-          </a:effectRef>
-          <a:fontRef idx="minor">
-            <a:schemeClr val="lt1"/>
-          </a:fontRef>
-        </p:style>
-        <p:txBody>
-          <a:bodyPr rtlCol="0" anchor="ctr"/>
-          <a:lstStyle/>
-          <a:p>
-            <a:pPr algn="ctr"/>
-            <a:r>
-              <a:rPr lang="de-CH" sz="1400" dirty="0">
-                <a:solidFill>
-                  <a:schemeClr val="tx1"/>
-                </a:solidFill>
-              </a:rPr>
-              <a:t>Nächster Zyklus erforderlich?</a:t>
-            </a:r>
-            <a:endParaRPr lang="en-GB" sz="1400" dirty="0">
-              <a:solidFill>
-                <a:schemeClr val="tx1"/>
-              </a:solidFill>
-            </a:endParaRPr>
-          </a:p>
-        </p:txBody>
-      </p:sp>
+      </p:pic>
     </p:spTree>
     <p:extLst>
       <p:ext uri="{BB962C8B-B14F-4D97-AF65-F5344CB8AC3E}">
@@ -10732,332 +11032,60 @@
           </a:p>
         </p:txBody>
       </p:sp>
-      <p:sp>
-        <p:nvSpPr>
-          <p:cNvPr id="5" name="Rechteck 4"/>
-          <p:cNvSpPr/>
+      <p:pic>
+        <p:nvPicPr>
+          <p:cNvPr id="2050" name="Picture 2"/>
+          <p:cNvPicPr>
+            <a:picLocks noChangeAspect="1" noChangeArrowheads="1"/>
+          </p:cNvPicPr>
           <p:nvPr/>
-        </p:nvSpPr>
-        <p:spPr>
+        </p:nvPicPr>
+        <p:blipFill>
+          <a:blip r:embed="rId3">
+            <a:extLst>
+              <a:ext uri="{28A0092B-C50C-407E-A947-70E740481C1C}">
+                <a14:useLocalDpi xmlns:a14="http://schemas.microsoft.com/office/drawing/2010/main" val="0"/>
+              </a:ext>
+            </a:extLst>
+          </a:blip>
+          <a:srcRect/>
+          <a:stretch>
+            <a:fillRect/>
+          </a:stretch>
+        </p:blipFill>
+        <p:spPr bwMode="auto">
           <a:xfrm>
-            <a:off x="6036911" y="4844918"/>
-            <a:ext cx="1159997" cy="425187"/>
+            <a:off x="4888523" y="3058259"/>
+            <a:ext cx="3894992" cy="3056247"/>
           </a:xfrm>
           <a:prstGeom prst="rect">
             <a:avLst/>
           </a:prstGeom>
+          <a:noFill/>
+          <a:ln>
+            <a:noFill/>
+          </a:ln>
+          <a:extLst>
+            <a:ext uri="{909E8E84-426E-40DD-AFC4-6F175D3DCCD1}">
+              <a14:hiddenFill xmlns:a14="http://schemas.microsoft.com/office/drawing/2010/main">
+                <a:solidFill>
+                  <a:schemeClr val="accent1"/>
+                </a:solidFill>
+              </a14:hiddenFill>
+            </a:ext>
+            <a:ext uri="{91240B29-F687-4F45-9708-019B960494DF}">
+              <a14:hiddenLine xmlns:a14="http://schemas.microsoft.com/office/drawing/2010/main" w="9525">
+                <a:solidFill>
+                  <a:schemeClr val="tx1"/>
+                </a:solidFill>
+                <a:miter lim="800000"/>
+                <a:headEnd/>
+                <a:tailEnd/>
+              </a14:hiddenLine>
+            </a:ext>
+          </a:extLst>
         </p:spPr>
-        <p:style>
-          <a:lnRef idx="1">
-            <a:schemeClr val="accent2"/>
-          </a:lnRef>
-          <a:fillRef idx="3">
-            <a:schemeClr val="accent2"/>
-          </a:fillRef>
-          <a:effectRef idx="2">
-            <a:schemeClr val="accent2"/>
-          </a:effectRef>
-          <a:fontRef idx="minor">
-            <a:schemeClr val="lt1"/>
-          </a:fontRef>
-        </p:style>
-        <p:txBody>
-          <a:bodyPr rtlCol="0" anchor="ctr"/>
-          <a:lstStyle/>
-          <a:p>
-            <a:pPr algn="ctr"/>
-            <a:r>
-              <a:rPr lang="de-CH" sz="1600" dirty="0" err="1" smtClean="0"/>
-              <a:t>customer</a:t>
-            </a:r>
-            <a:endParaRPr lang="de-CH" sz="1600" dirty="0"/>
-          </a:p>
-        </p:txBody>
-      </p:sp>
-      <p:sp>
-        <p:nvSpPr>
-          <p:cNvPr id="6" name="Rechteck 5"/>
-          <p:cNvSpPr/>
-          <p:nvPr/>
-        </p:nvSpPr>
-        <p:spPr>
-          <a:xfrm>
-            <a:off x="4473452" y="3096595"/>
-            <a:ext cx="752980" cy="401452"/>
-          </a:xfrm>
-          <a:prstGeom prst="rect">
-            <a:avLst/>
-          </a:prstGeom>
-        </p:spPr>
-        <p:style>
-          <a:lnRef idx="1">
-            <a:schemeClr val="accent2"/>
-          </a:lnRef>
-          <a:fillRef idx="3">
-            <a:schemeClr val="accent2"/>
-          </a:fillRef>
-          <a:effectRef idx="2">
-            <a:schemeClr val="accent2"/>
-          </a:effectRef>
-          <a:fontRef idx="minor">
-            <a:schemeClr val="lt1"/>
-          </a:fontRef>
-        </p:style>
-        <p:txBody>
-          <a:bodyPr rtlCol="0" anchor="ctr"/>
-          <a:lstStyle/>
-          <a:p>
-            <a:pPr algn="ctr"/>
-            <a:r>
-              <a:rPr lang="de-CH" sz="1600" dirty="0" err="1" smtClean="0"/>
-              <a:t>users</a:t>
-            </a:r>
-            <a:endParaRPr lang="de-CH" sz="1600" dirty="0"/>
-          </a:p>
-        </p:txBody>
-      </p:sp>
-      <p:sp>
-        <p:nvSpPr>
-          <p:cNvPr id="7" name="Rechteck 6"/>
-          <p:cNvSpPr/>
-          <p:nvPr/>
-        </p:nvSpPr>
-        <p:spPr>
-          <a:xfrm>
-            <a:off x="7037034" y="3096595"/>
-            <a:ext cx="1349941" cy="310216"/>
-          </a:xfrm>
-          <a:prstGeom prst="rect">
-            <a:avLst/>
-          </a:prstGeom>
-        </p:spPr>
-        <p:style>
-          <a:lnRef idx="1">
-            <a:schemeClr val="accent2"/>
-          </a:lnRef>
-          <a:fillRef idx="3">
-            <a:schemeClr val="accent2"/>
-          </a:fillRef>
-          <a:effectRef idx="2">
-            <a:schemeClr val="accent2"/>
-          </a:effectRef>
-          <a:fontRef idx="minor">
-            <a:schemeClr val="lt1"/>
-          </a:fontRef>
-        </p:style>
-        <p:txBody>
-          <a:bodyPr rtlCol="0" anchor="ctr"/>
-          <a:lstStyle/>
-          <a:p>
-            <a:pPr algn="ctr"/>
-            <a:r>
-              <a:rPr lang="de-CH" sz="1600" dirty="0" err="1" smtClean="0"/>
-              <a:t>management</a:t>
-            </a:r>
-            <a:endParaRPr lang="de-CH" sz="1600" dirty="0"/>
-          </a:p>
-        </p:txBody>
-      </p:sp>
-      <p:sp>
-        <p:nvSpPr>
-          <p:cNvPr id="8" name="Rechteck 7"/>
-          <p:cNvSpPr/>
-          <p:nvPr/>
-        </p:nvSpPr>
-        <p:spPr>
-          <a:xfrm>
-            <a:off x="6526384" y="5945273"/>
-            <a:ext cx="1297012" cy="496503"/>
-          </a:xfrm>
-          <a:prstGeom prst="rect">
-            <a:avLst/>
-          </a:prstGeom>
-        </p:spPr>
-        <p:style>
-          <a:lnRef idx="1">
-            <a:schemeClr val="accent4"/>
-          </a:lnRef>
-          <a:fillRef idx="3">
-            <a:schemeClr val="accent4"/>
-          </a:fillRef>
-          <a:effectRef idx="2">
-            <a:schemeClr val="accent4"/>
-          </a:effectRef>
-          <a:fontRef idx="minor">
-            <a:schemeClr val="lt1"/>
-          </a:fontRef>
-        </p:style>
-        <p:txBody>
-          <a:bodyPr rtlCol="0" anchor="ctr"/>
-          <a:lstStyle/>
-          <a:p>
-            <a:pPr algn="ctr"/>
-            <a:r>
-              <a:rPr lang="de-CH" sz="1600" dirty="0" err="1"/>
-              <a:t>d</a:t>
-            </a:r>
-            <a:r>
-              <a:rPr lang="de-CH" sz="1600" dirty="0" err="1" smtClean="0"/>
-              <a:t>evelopment</a:t>
-            </a:r>
-            <a:r>
-              <a:rPr lang="de-CH" sz="1600" dirty="0" smtClean="0"/>
-              <a:t> </a:t>
-            </a:r>
-            <a:r>
-              <a:rPr lang="de-CH" sz="1600" dirty="0" err="1" smtClean="0"/>
-              <a:t>team</a:t>
-            </a:r>
-            <a:r>
-              <a:rPr lang="de-CH" sz="1600" dirty="0" smtClean="0"/>
-              <a:t> </a:t>
-            </a:r>
-            <a:endParaRPr lang="de-CH" sz="1600" dirty="0"/>
-          </a:p>
-        </p:txBody>
-      </p:sp>
-      <p:sp>
-        <p:nvSpPr>
-          <p:cNvPr id="9" name="Ellipse 8"/>
-          <p:cNvSpPr/>
-          <p:nvPr/>
-        </p:nvSpPr>
-        <p:spPr>
-          <a:xfrm>
-            <a:off x="4273429" y="3672176"/>
-            <a:ext cx="4005717" cy="2504105"/>
-          </a:xfrm>
-          <a:prstGeom prst="ellipse">
-            <a:avLst/>
-          </a:prstGeom>
-          <a:noFill/>
-          <a:ln w="38100"/>
-        </p:spPr>
-        <p:style>
-          <a:lnRef idx="1">
-            <a:schemeClr val="accent1"/>
-          </a:lnRef>
-          <a:fillRef idx="3">
-            <a:schemeClr val="accent1"/>
-          </a:fillRef>
-          <a:effectRef idx="2">
-            <a:schemeClr val="accent1"/>
-          </a:effectRef>
-          <a:fontRef idx="minor">
-            <a:schemeClr val="lt1"/>
-          </a:fontRef>
-        </p:style>
-        <p:txBody>
-          <a:bodyPr rtlCol="0" anchor="ctr"/>
-          <a:lstStyle/>
-          <a:p>
-            <a:pPr algn="ctr"/>
-            <a:endParaRPr lang="de-CH"/>
-          </a:p>
-        </p:txBody>
-      </p:sp>
-      <p:cxnSp>
-        <p:nvCxnSpPr>
-          <p:cNvPr id="10" name="Gerade Verbindung 12"/>
-          <p:cNvCxnSpPr>
-            <a:stCxn id="6" idx="2"/>
-            <a:endCxn id="5" idx="0"/>
-          </p:cNvCxnSpPr>
-          <p:nvPr/>
-        </p:nvCxnSpPr>
-        <p:spPr>
-          <a:xfrm>
-            <a:off x="4849942" y="3498047"/>
-            <a:ext cx="1766968" cy="1346871"/>
-          </a:xfrm>
-          <a:prstGeom prst="line">
-            <a:avLst/>
-          </a:prstGeom>
-        </p:spPr>
-        <p:style>
-          <a:lnRef idx="2">
-            <a:schemeClr val="accent1"/>
-          </a:lnRef>
-          <a:fillRef idx="0">
-            <a:schemeClr val="accent1"/>
-          </a:fillRef>
-          <a:effectRef idx="1">
-            <a:schemeClr val="accent1"/>
-          </a:effectRef>
-          <a:fontRef idx="minor">
-            <a:schemeClr val="tx1"/>
-          </a:fontRef>
-        </p:style>
-      </p:cxnSp>
-      <p:cxnSp>
-        <p:nvCxnSpPr>
-          <p:cNvPr id="11" name="Gerade Verbindung 13"/>
-          <p:cNvCxnSpPr>
-            <a:endCxn id="5" idx="0"/>
-          </p:cNvCxnSpPr>
-          <p:nvPr/>
-        </p:nvCxnSpPr>
-        <p:spPr>
-          <a:xfrm flipH="1">
-            <a:off x="6616910" y="3496755"/>
-            <a:ext cx="1146750" cy="1348163"/>
-          </a:xfrm>
-          <a:prstGeom prst="line">
-            <a:avLst/>
-          </a:prstGeom>
-        </p:spPr>
-        <p:style>
-          <a:lnRef idx="2">
-            <a:schemeClr val="accent1"/>
-          </a:lnRef>
-          <a:fillRef idx="0">
-            <a:schemeClr val="accent1"/>
-          </a:fillRef>
-          <a:effectRef idx="1">
-            <a:schemeClr val="accent1"/>
-          </a:effectRef>
-          <a:fontRef idx="minor">
-            <a:schemeClr val="tx1"/>
-          </a:fontRef>
-        </p:style>
-      </p:cxnSp>
-      <p:cxnSp>
-        <p:nvCxnSpPr>
-          <p:cNvPr id="12" name="Gerade Verbindung mit Pfeil 11"/>
-          <p:cNvCxnSpPr>
-            <a:stCxn id="5" idx="2"/>
-            <a:endCxn id="8" idx="0"/>
-          </p:cNvCxnSpPr>
-          <p:nvPr/>
-        </p:nvCxnSpPr>
-        <p:spPr>
-          <a:xfrm>
-            <a:off x="6616910" y="5270105"/>
-            <a:ext cx="557980" cy="675168"/>
-          </a:xfrm>
-          <a:prstGeom prst="straightConnector1">
-            <a:avLst/>
-          </a:prstGeom>
-          <a:ln>
-            <a:headEnd type="arrow"/>
-            <a:tailEnd type="arrow"/>
-          </a:ln>
-        </p:spPr>
-        <p:style>
-          <a:lnRef idx="2">
-            <a:schemeClr val="accent1"/>
-          </a:lnRef>
-          <a:fillRef idx="0">
-            <a:schemeClr val="accent1"/>
-          </a:fillRef>
-          <a:effectRef idx="1">
-            <a:schemeClr val="accent1"/>
-          </a:effectRef>
-          <a:fontRef idx="minor">
-            <a:schemeClr val="tx1"/>
-          </a:fontRef>
-        </p:style>
-      </p:cxnSp>
+      </p:pic>
     </p:spTree>
     <p:extLst>
       <p:ext uri="{BB962C8B-B14F-4D97-AF65-F5344CB8AC3E}">
@@ -11981,11 +12009,12 @@
 </file>
 
 <file path=customXml/item1.xml><?xml version="1.0" encoding="utf-8"?>
-<p:properties xmlns:p="http://schemas.microsoft.com/office/2006/metadata/properties" xmlns:xsi="http://www.w3.org/2001/XMLSchema-instance">
-  <documentManagement>
-    <AVMTitle xmlns="5091c847-84be-4f4f-b16c-c018ad2ca66b">Präsentation BFH_2013</AVMTitle>
-  </documentManagement>
-</p:properties>
+<?mso-contentType ?>
+<FormTemplates xmlns="http://schemas.microsoft.com/sharepoint/v3/contenttype/forms">
+  <Display>DocumentLibraryForm</Display>
+  <Edit>DocumentLibraryForm</Edit>
+  <New>DocumentLibraryForm</New>
+</FormTemplates>
 </file>
 
 <file path=customXml/item2.xml><?xml version="1.0" encoding="utf-8"?>
@@ -12049,25 +12078,17 @@
 </file>
 
 <file path=customXml/item3.xml><?xml version="1.0" encoding="utf-8"?>
-<?mso-contentType ?>
-<FormTemplates xmlns="http://schemas.microsoft.com/sharepoint/v3/contenttype/forms">
-  <Display>DocumentLibraryForm</Display>
-  <Edit>DocumentLibraryForm</Edit>
-  <New>DocumentLibraryForm</New>
-</FormTemplates>
+<p:properties xmlns:p="http://schemas.microsoft.com/office/2006/metadata/properties" xmlns:xsi="http://www.w3.org/2001/XMLSchema-instance">
+  <documentManagement>
+    <AVMTitle xmlns="5091c847-84be-4f4f-b16c-c018ad2ca66b">Präsentation BFH_2013</AVMTitle>
+  </documentManagement>
+</p:properties>
 </file>
 
 <file path=customXml/itemProps1.xml><?xml version="1.0" encoding="utf-8"?>
-<ds:datastoreItem xmlns:ds="http://schemas.openxmlformats.org/officeDocument/2006/customXml" ds:itemID="{32991507-CB83-4F49-BAFB-D322B1D04098}">
+<ds:datastoreItem xmlns:ds="http://schemas.openxmlformats.org/officeDocument/2006/customXml" ds:itemID="{1851D33F-E468-417B-A30C-509B68D2BD09}">
   <ds:schemaRefs>
-    <ds:schemaRef ds:uri="http://schemas.microsoft.com/office/2006/metadata/properties"/>
-    <ds:schemaRef ds:uri="http://schemas.microsoft.com/office/2006/documentManagement/types"/>
-    <ds:schemaRef ds:uri="5091c847-84be-4f4f-b16c-c018ad2ca66b"/>
-    <ds:schemaRef ds:uri="http://purl.org/dc/elements/1.1/"/>
-    <ds:schemaRef ds:uri="http://schemas.openxmlformats.org/package/2006/metadata/core-properties"/>
-    <ds:schemaRef ds:uri="http://purl.org/dc/terms/"/>
-    <ds:schemaRef ds:uri="http://www.w3.org/XML/1998/namespace"/>
-    <ds:schemaRef ds:uri="http://purl.org/dc/dcmitype/"/>
+    <ds:schemaRef ds:uri="http://schemas.microsoft.com/sharepoint/v3/contenttype/forms"/>
   </ds:schemaRefs>
 </ds:datastoreItem>
 </file>
@@ -12090,9 +12111,16 @@
 </file>
 
 <file path=customXml/itemProps3.xml><?xml version="1.0" encoding="utf-8"?>
-<ds:datastoreItem xmlns:ds="http://schemas.openxmlformats.org/officeDocument/2006/customXml" ds:itemID="{1851D33F-E468-417B-A30C-509B68D2BD09}">
+<ds:datastoreItem xmlns:ds="http://schemas.openxmlformats.org/officeDocument/2006/customXml" ds:itemID="{32991507-CB83-4F49-BAFB-D322B1D04098}">
   <ds:schemaRefs>
-    <ds:schemaRef ds:uri="http://schemas.microsoft.com/sharepoint/v3/contenttype/forms"/>
+    <ds:schemaRef ds:uri="http://schemas.microsoft.com/office/2006/metadata/properties"/>
+    <ds:schemaRef ds:uri="http://schemas.microsoft.com/office/2006/documentManagement/types"/>
+    <ds:schemaRef ds:uri="5091c847-84be-4f4f-b16c-c018ad2ca66b"/>
+    <ds:schemaRef ds:uri="http://purl.org/dc/elements/1.1/"/>
+    <ds:schemaRef ds:uri="http://schemas.openxmlformats.org/package/2006/metadata/core-properties"/>
+    <ds:schemaRef ds:uri="http://purl.org/dc/terms/"/>
+    <ds:schemaRef ds:uri="http://www.w3.org/XML/1998/namespace"/>
+    <ds:schemaRef ds:uri="http://purl.org/dc/dcmitype/"/>
   </ds:schemaRefs>
 </ds:datastoreItem>
 </file>
</xml_diff>